<commit_message>
i2c-tx or master - start stop cycles corrected
</commit_message>
<xml_diff>
--- a/I2C/I2C_implementation_Summary.pptx
+++ b/I2C/I2C_implementation_Summary.pptx
@@ -9,6 +9,7 @@
     <p:sldId id="265" r:id="rId3"/>
     <p:sldId id="257" r:id="rId4"/>
     <p:sldId id="267" r:id="rId5"/>
+    <p:sldId id="282" r:id="rId6"/>
   </p:sldIdLst>
   <p:sldSz cx="9144000" cy="5143500" type="screen16x9"/>
   <p:notesSz cx="6858000" cy="9144000"/>
@@ -157,6 +158,58 @@
     </p:ext>
   </p:extLst>
 </p:presentation>
+</file>
+
+<file path=ppt/ink/ink1.xml><?xml version="1.0" encoding="utf-8"?>
+<inkml:ink xmlns:inkml="http://www.w3.org/2003/InkML">
+  <inkml:definitions>
+    <inkml:context xml:id="ctx0">
+      <inkml:inkSource xml:id="inkSrc0">
+        <inkml:traceFormat>
+          <inkml:channel name="X" type="integer" max="1920" units="cm"/>
+          <inkml:channel name="Y" type="integer" max="1080" units="cm"/>
+          <inkml:channel name="T" type="integer" max="2.14748E9" units="dev"/>
+        </inkml:traceFormat>
+        <inkml:channelProperties>
+          <inkml:channelProperty channel="X" name="resolution" value="62.13592" units="1/cm"/>
+          <inkml:channelProperty channel="Y" name="resolution" value="62.06897" units="1/cm"/>
+          <inkml:channelProperty channel="T" name="resolution" value="1" units="1/dev"/>
+        </inkml:channelProperties>
+      </inkml:inkSource>
+      <inkml:timestamp xml:id="ts0" timeString="2021-02-13T12:49:58.090"/>
+    </inkml:context>
+    <inkml:brush xml:id="br0">
+      <inkml:brushProperty name="width" value="0.05292" units="cm"/>
+      <inkml:brushProperty name="height" value="0.05292" units="cm"/>
+      <inkml:brushProperty name="color" value="#FF0000"/>
+    </inkml:brush>
+  </inkml:definitions>
+  <inkml:trace contextRef="#ctx0" brushRef="#br0">8453 4617 0,'14'26'109,"-1"-12"-93,-13-1 31,0 13-16,0-12 0,0-1 1,0 0-1,0 13-31,13 1 16,-13-14 15,0 14-31,0-14 15,0 0 1,0 0 0,0 27 15,0-27 16,13 0-32,1 1 1,25 12 0,-39-13-1,0 1 1</inkml:trace>
+  <inkml:trace contextRef="#ctx0" brushRef="#br0" timeOffset="2777.45">9988 4670 0,'13'0'47,"14"0"-47,-14 0 16,0 0-1,0 0 48,1 13 78,-1-13-141,0 13 15,0 1 1,1 12 15,-14-13 16,13 0-47,-13 14 31,0-14-15,0 0-1,0 1 1,0 25 0,0-25-1,0 12 1,0-13-16,-27 0 16,14 1-1,0-1 1,0 0 124,13 0-61,39-13-64,14 0 1,-26 0-1,-14 0 1,27 0 15,-27 0-15,0 0 15,0 0-15,14 0-1,-1 0 1,-13 0 0</inkml:trace>
+  <inkml:trace contextRef="#ctx0" brushRef="#br0" timeOffset="5446.64">11483 4551 0,'13'0'109,"27"0"-109,-27 0 16,14 0-16,12 0 15,-12 0 1,52 0-1,-66 0 1,14 0 31,-14 0-16,0 0 32,-13 13-48,0 14 17,-13-14-17,0 0 1,0 0-1,-1 0 1,1 1 0,0 12 15,-14-13-15,1-13-1,13 14 1,-1-1 15,14 0 219,14-13-234,-1 0 62,40 13-78,-40-13 15,27 0 1,-27 13 0,0-13-16,27 27 15,-27-27 1,27 13 46,-27 0-30,0-13-32,0 14 47,-13-1-32,0 0 16,0 0-15,0 1-16,0 12 16,0-13-16,0 27 15,-13-27 1,0 0 0,-40 14-1,40-14 16,-14-13-15,-25 13 0,25-13 15,14 0-15,-27 0-1,-13 0 1,40 0-1,-27 0 110,27 0-125,0 0 16,-14 0 0</inkml:trace>
+  <inkml:trace contextRef="#ctx0" brushRef="#br0" timeOffset="8791.12">13031 4524 0,'0'40'63,"0"-27"-63,-13 14 16,13-1-1,-27 14-15,1 13 31,26-40 141,0 0-156,0 0-16,-14 27 31,14-27 0,-13 27-15,53-40 187,-14 0-187,27 0-1,-26 0 1,-14 0 93,-13-13-30,0-14 14,0 14-77,0 40 281,0-14-282,0 13-15,0-12 16,0 12 0,0 0-1,0-12 1,0-1 0,0 0 77,0 14-77,0-14 0,0 0-1</inkml:trace>
+  <inkml:trace contextRef="#ctx0" brushRef="#br0" timeOffset="11984.51">14473 4524 0,'13'0'125,"0"0"-125,0 0 16,14 0 15,-14 0 0,14-13 63,-14 0 0,0 13 31,0 0-110,0 0 1,-26 0 203,0 0-204,-13 13 1,-1-13 0,14 0-1,-40 13-15,26 14 32,-39-14-17,53-13 1,0 13-1,0 1 17,13 12 155,0-13-171,13 14-16,13 12 31,-26-25-15,14-1 93,-1-13-78,13 0 1,-13-13-17,1 13 1,39 0-16,-27 0 31,14 0-15,-27 0-16,13 0 15,27 0 32,-39 0-31,-1 0 46,0 0-62,-13 13 16,0 0 0,0 40-1,0-40 1,0 0-1,0 1 1,-26 25 15,12-39-31,1 14 16,-13-1 0,-1-13-1,14 13 1,0-13 15,-40 0-15,-53 0-1,27 40 1,65-40 0,-12 0 15,13 0 47</inkml:trace>
+  <inkml:trace contextRef="#ctx0" brushRef="#br0" timeOffset="14303.21">16060 4485 0,'0'53'31,"0"-40"-31,0 0 32,-13 14-17,13-14 1,0 0 15,0 0-15,0 0 46,0 14-46,0-14-1,0 0 48,0 1-47,13 38-16,0-38 31,1-1-16,12 0 95,-13-13-95,1 0-15,12 0 16,14 27 0,-27-27-1,13 0 48,-12-14-48,-1 1 1,-13 0 31,0 0-16,0-1 47,0 1 63,0 0-125,-13-13 15,-1 26 0,-12 0-31,13 0 16,-1 0-1,1 0-15,-53 0 16,53 0 0</inkml:trace>
+  <inkml:trace contextRef="#ctx0" brushRef="#br0" timeOffset="16680.11">17370 4564 0,'40'0'110,"-14"0"-95,0 0 1,41 0 0,-41 13 187,-26 1-188,0 12 1,0-13 0,0 27-1,0-14 1,0 14-1,0-27-15,0 0 32,0 1-17,0 12 1,0-13 0,0 1 15</inkml:trace>
+  <inkml:trace contextRef="#ctx0" brushRef="#br0" timeOffset="19319.02">19037 4551 0,'-13'-13'16,"-1"13"15,1 0 0,0 13-15,13 0 0,0 0-1,0 27 1,0-27-1,0 0 1,0 1 0,0 12-1,26 1 188,1-1-187,12-26 0,-25 13-1,-1 0 95,-13 1-95,13-1 1,-13 0 0,0 14-16,0-1 31,0-13-16,0 14 1,0-14-16,0 13 31,-40 27-15,27-39-16,-13-1 31,-1-13 0,14 13-31,-66 14 16,52-27 15,-12 0-15,25 0 0,-12 0-1,13 0 16,-1 0 16,14-14-31,0-25 15,14 25-15,-1 1-1,0 0-15,40-27 16,-13 27 15,-14 0-15,-13 0 31,1-1-16,12-12-15,-13 13-1,1-1 1,-1 1 0,-13 0-1,39-27-15,-25 14 31,-14 13-31,13-14 16,0-39 15,0 40-15,14 12 0,-1-39-1,-12 14 1,-14 25 15,0 1 125,-14 13-140,1 0 0,0 0 46,0 0-46,-1 13 15,-25 14 47,25 13-47,1-27-15,0 0 0,0 14-16,0-27 15,-1 13 16,1 0 16</inkml:trace>
+  <inkml:trace contextRef="#ctx0" brushRef="#br0" timeOffset="21728.93">20730 4419 0,'0'-53'0,"0"39"15,-13 1 1,-27 0 0,14-27-1,-1 40 1,14 0-1,-40 0 1,40 0 0,0 0-16,-27 0 15,27 0 1,0 0 0,-14 0 15,-13 40-16,40-27 1,0 0 0,0 1 15,0 39-15,0-40-1,0 13 1,0 14-1,0-27 1,0 0-16,14 1 16,-1 12-1,0-13 1,0-13 0,14 14-1,12-14 1,-25 0-1,-1 0 17,27 0-17,-14 0-15,1-27 16,-1-13 0,-26 27 77,0 0-46,0 0-31,0-1-1,26-12 79,-26 13-78,14-14-16,-14 1 31,0 52 157,0-12-188,13 25 15,-13-12 1,0-14-1,0 0-15,0 40 16,0-40 0,13 67-1,0-67 1,-13 13 15,14 14-15,-14 13-1,0-27 1,0 27 0,0-13 15,0-27-31,0 27 31,0-14-15,0-12-1</inkml:trace>
+  <inkml:trace contextRef="#ctx0" brushRef="#br0" timeOffset="25999.77">8506 5689 0,'-13'0'62,"13"13"-46,0 13-1,0-13-15,0 1 16,0 25 0,0 14-1,0-13 1,0 13 0,0-13-1,0-27 1</inkml:trace>
+  <inkml:trace contextRef="#ctx0" brushRef="#br0" timeOffset="27792.34">9869 5689 0,'0'13'63,"13"0"-48,-13 0-15,0 0 16,0 14 0,13 13-16,-13-27 15,53 27 1,-26 26-1,26-53 17,-40-13-17,0 13 1,14 0 0,26-13-1,-27 0 1,27 0-1,-27 0 1,1-26 0,-14-14-1,27-52 1,-40 39 0,0-13-1,0 26 1,0 0 15,0 14-15,0-1 15,0 1 47,-13 26-47,-40 0-15,39 0-16,-65 13 16,66 0 30,0-13-14,-14 0-17,1 13-15,12-13 16,-39 27 15,40-14 16,0 0-16,13 14 32,0-14-48,0 0 1,0 1 0,0 12-1,0-13-15,0 53 32,0-52-17,0 12 1</inkml:trace>
+  <inkml:trace contextRef="#ctx0" brushRef="#br0" timeOffset="28623.88">11271 5689 0,'0'0'0,"0"13"94,13 0-78,-13 0-16,0 27 15,0-27 1,0 0 0,14 14-1,-14-1 1,0-12 0,0-1-1</inkml:trace>
+  <inkml:trace contextRef="#ctx0" brushRef="#br0" timeOffset="30198.78">13110 5636 0,'-13'0'109,"13"26"-93,0-13-1,0 14-15,0 12 16,0 28-1,26-1 1,1-27 0,-1-12-1,-13-14 32,14-13-31,-14 0-1,14 0 1,-1 0 0,14 0-1,-27-13 1,0 0 15,-13-27-31,27 14 16,-1-41-1,-13 14 1,-13 27 0,0 0-1,0-1 17,0 14-17,0-14 1,0 1-1,0 13 1,0-14 0,-13 27-1,-27-13 1,14 13 0,0 0 30,12 0-46,-12 0 16,13 0 0,-1 0-1,1 0 48,0 0-48,-27 13-15,27 0 16,0 14 0,-14-1 46,14-12-46,13-1-1,-13 0 1,13 0-16,-13 27 31,-1-14-31,-12 14 32</inkml:trace>
+  <inkml:trace contextRef="#ctx0" brushRef="#br0" timeOffset="31016.04">14235 5622 0,'13'0'46,"-13"14"-14,0 12-17,0-13 1,0 1 0,0 25-1,0-12 1,0-14-1,0 27 1,0-27 0,0 0-1,0 0 1</inkml:trace>
+  <inkml:trace contextRef="#ctx0" brushRef="#br0" timeOffset="32984.19">15597 5675 0,'13'14'78,"-13"-1"-62,14 0-16,-1 0 15,0 14 64,27 12-79,-27-39 15,27 14 1,-14-14-1,-13 0 32,1 0-31,-1 0 0,53 0-1,-53-14 1,-13 1-1,13-27 1,-13 14 0,0-27-1,0 40 1,0 0 0,0-27-1,0 13 1,-39-12-1,26 12 1,-40-39 0,39 53-1,1 13 17,-27-13-17,14 13 1,-27 0-1,-26 0 1,52 0-16,-26 0 16,40 0-16,0 0 15,-27 26 1,27-13 0,0 27-1,13-27 48,0 1-32,0 25-15,0-26 15,0 1 0,0-1-15,13 0-1,13 14 1,-12-14 0,12 13-1,-13-12 1,1 12-1,-1-13 1,0 0 0,0 1-1,1-1 17,-1 27-17,0-27 1,40 13-1,-40-26 1,27 14 0,-27-14 171,0 0-187,27 0 16,0 0-1,-1 0 1</inkml:trace>
+  <inkml:trace contextRef="#ctx0" brushRef="#br0" timeOffset="33887.08">17410 5609 0,'13'0'16,"-13"13"31,0 1-31,0-1-1,0 53 1,0-13-1,0-27 1,0 14 0,0-13-1,0 12 1</inkml:trace>
+  <inkml:trace contextRef="#ctx0" brushRef="#br0" timeOffset="35279.54">18772 5503 0,'0'14'47,"0"-1"-31,0 13-1,0-13 1,0 1-16,0 52 16,0-40-1,0 40 1,0-26-1,0-27 1,0 1 0,0-1 15,13 0 0,27-13-15,-27 0-1,53 0 1,-26 0 0,26-13-1,-39-27 1,39-26 0,-13-27-1,-27 67 1,-12-14-1,-14 27 1,0 0 0,0-14-1,0 14 1,0 0 0,0-14 15,-40 1-16,-26 26 1,13 0 0,-53 0-1,27 0 1,12 0 0,54 0-16,0 0 15,-27 0 1,14 0-1,13 0 17,-1 13-17,14 14 32,-13-14-31,0 0-1</inkml:trace>
+  <inkml:trace contextRef="#ctx0" brushRef="#br0" timeOffset="38161.22">20743 5728 0,'0'13'62,"0"1"-62,0 39 16,0 26 0,0-53-1,0 27 1,0-39-16,0 52 16,40-40-1,-14 1 1,1-1 15,-1-26-15,14 0-1,-27 0 1,67-53 0,-27-13-1,0-27 16,-40 41-15,-13 38 0,0 1 15,0 0-15,0 0-1,0-1-15,0 1 31,0 0-15,0 0 0,-13 13-1,-1 0 17,1 0-17,-13 0 1,12 0-16,1 0 15,0 0 17,-14 0-17,1 0 1,-27 0 0,40 0-1,0 0 16,-1 0-15,-12 0 15,13 0-31,-1 0 16,1 13 0,0 13 15,13-12 0,0 25-15,0-12-1,-13-14 1,0 0 0,13 0 15,0 1-16</inkml:trace>
+  <inkml:trace contextRef="#ctx0" brushRef="#br0" timeOffset="39608.89">22000 5781 0,'13'0'78,"-13"13"-62,0 14-1,27-1-15,-14-12 16,-13 38-16,13 1 16,-13-13-1,0 0 16,0-27-15</inkml:trace>
+  <inkml:trace contextRef="#ctx0" brushRef="#br0" timeOffset="41698.18">6628 5861 0,'13'13'125,"0"0"-109,1-13 0,-1 0-1,53 0 1,-13-53-1,-27 40-15,14-40 16,-27 26 0,14 1-1,-27 0 1,0-14 0,0 13-1,-14-39 1,1 53-1,0-13 1,-14 12 0,1 1-1,-14 13 1,14 0 15,-40 0-15,26 0-1,0 0 17,1 13-17,12 1 1,14 25 0,13-26 15,0 1-16,0-1-15,0 13 16,0 1 0,0 13-1,0-1-15,0 1 16,0 0 15,13 13-15,0-40-1,-13 0 1,14 13 0,-1 1-1,0-14 32,14-13-47,39 27 16,0-27-1,-40 0 1,-12 0 0,12 0-1,-13 0 1,0 0 46,1-14-62,-1 1 16,0 0 0,0 0-1,1-1 79,-14-25-16</inkml:trace>
+  <inkml:trace contextRef="#ctx0" brushRef="#br0" timeOffset="44200.1">6800 6324 0,'-27'13'140,"14"0"-124,0 13 0,13-12-1,0 25 1,0-25-1,0-1 1,0 27 0,0-27-1,0 0 63,40-13-78,-27 0 16,0 0-16,27 0 16,-14 0-1,1 0-15,-14 0 16,0 0 0,0 0 109,27 0-110,-27 0 1,0 13-16,1 0 15,-14 14 1,0-14 0,0 0-1,0 27 1,0-27 15,-14 27 16,1-40-31,0 0 77,0 0-93,-14 0 0,14 13 16,0 0 0,0-13 15,-14 0-15,14 0-16,0 0 15,-1 0 16,-12-13-15,13 13 0,0 0-1,-1-26 63</inkml:trace>
+  <inkml:trace contextRef="#ctx0" brushRef="#br0" timeOffset="47027.91">20717 6760 0,'0'13'63,"0"1"-63,0-1 16,0 0-16,0 53 15,0 14 16,0-14-15,0-13 0,0-27-1,0-13 1,0 14 46,0-14-62,-13-26 110,13-27-95,-14 27-15,14-14 16,0-39 0,0 13-1,0-13 1,0 53 0,0-14-1,0 1 1,14-14-1,-1 1 1,0 25 47,0 1-32,1 13-31,-1 0 15,0-13 1,0 13 0,14 0 15,-14 0 0,0 0-15,0 0-1,27 0 1,-27 0-16,1 40 16,-14-27-1,13 13-15,-13 1 16,13 26 0,-13-40-1,0 40 16,0-27-15,0-12 0,0 12 15,0-13-15,0 0-1,0 1 1,0 12 187,0-13-187,0 14-1,0 13-15,0-27 16,0 26-1,40 28 1,-40-28 0,-14-52 187,-12-40-172,26 40-31</inkml:trace>
+  <inkml:trace contextRef="#ctx0" brushRef="#br0" timeOffset="47865.1">20677 6998 0,'-13'0'94,"26"0"-48,0 0-30,1 0-16,39 0 16,-27 0-1,-13 0 1,27 0 0,-14-13-1,1 13 16,-14-13-15</inkml:trace>
+  <inkml:trace contextRef="#ctx0" brushRef="#br0" timeOffset="48810.41">22291 6641 0,'0'13'47,"0"40"-31,0-40-1,0 54-15,-26 38 16,26-25 0,0 26-1,0-53 16,0-40-31,0 26 16,0-78 156</inkml:trace>
+  <inkml:trace contextRef="#ctx0" brushRef="#br0" timeOffset="50390.5">22251 6707 0,'14'0'16,"-1"0"15,13 0-15,-12 0-1,-1-13 1,0 13 46,14 0-30,-14 0-1,13 0-16,14 0 48,-14 0-47,-12 0 15,12 0-16,-13 0 17,-13 13-1,0 0 0,0 14-15,0-14-16,0 0 47,0 1-16,0 12 0,0-13 16,-13 0 31,-13-13-62,12 14-16,-12-1 15,-27 27 1,27-27 0,-14 0-1,27-13 1,-1 13 0,-12 1-16,13-1 15,-14 0 16</inkml:trace>
+</inkml:ink>
 </file>
 
 <file path=ppt/slideLayouts/slideLayout1.xml><?xml version="1.0" encoding="utf-8"?>
@@ -2953,7 +3006,7 @@
               </a14:hiddenLine>
             </a:ext>
             <a:ext uri="{FAA26D3D-D897-4be2-8F04-BA451C77F1D7}">
-              <ma14:placeholderFlag xmlns="" xmlns:ma14="http://schemas.microsoft.com/office/mac/drawingml/2011/main" val="1"/>
+              <ma14:placeholderFlag xmlns:ma14="http://schemas.microsoft.com/office/mac/drawingml/2011/main" xmlns="" val="1"/>
             </a:ext>
           </a:extLst>
         </p:spPr>
@@ -3336,14 +3389,14 @@
           </a:ln>
           <a:extLst>
             <a:ext uri="{909E8E84-426E-40dd-AFC4-6F175D3DCCD1}">
-              <a14:hiddenFill xmlns="" xmlns:a14="http://schemas.microsoft.com/office/drawing/2010/main">
+              <a14:hiddenFill xmlns:a14="http://schemas.microsoft.com/office/drawing/2010/main" xmlns="">
                 <a:solidFill>
                   <a:srgbClr val="FFFFFF"/>
                 </a:solidFill>
               </a14:hiddenFill>
             </a:ext>
             <a:ext uri="{91240B29-F687-4f45-9708-019B960494DF}">
-              <a14:hiddenLine xmlns="" xmlns:a14="http://schemas.microsoft.com/office/drawing/2010/main" w="9525">
+              <a14:hiddenLine xmlns:a14="http://schemas.microsoft.com/office/drawing/2010/main" xmlns="" w="9525">
                 <a:solidFill>
                   <a:srgbClr val="000000"/>
                 </a:solidFill>
@@ -3446,7 +3499,7 @@
               </a14:hiddenLine>
             </a:ext>
             <a:ext uri="{FAA26D3D-D897-4be2-8F04-BA451C77F1D7}">
-              <ma14:placeholderFlag xmlns="" xmlns:ma14="http://schemas.microsoft.com/office/mac/drawingml/2011/main" val="1"/>
+              <ma14:placeholderFlag xmlns:ma14="http://schemas.microsoft.com/office/mac/drawingml/2011/main" xmlns="" val="1"/>
             </a:ext>
           </a:extLst>
         </p:spPr>
@@ -3673,14 +3726,14 @@
           </a:ln>
           <a:extLst>
             <a:ext uri="{909E8E84-426E-40dd-AFC4-6F175D3DCCD1}">
-              <a14:hiddenFill xmlns="" xmlns:a14="http://schemas.microsoft.com/office/drawing/2010/main">
+              <a14:hiddenFill xmlns:a14="http://schemas.microsoft.com/office/drawing/2010/main" xmlns="">
                 <a:solidFill>
                   <a:srgbClr val="FFFFFF"/>
                 </a:solidFill>
               </a14:hiddenFill>
             </a:ext>
             <a:ext uri="{91240B29-F687-4f45-9708-019B960494DF}">
-              <a14:hiddenLine xmlns="" xmlns:a14="http://schemas.microsoft.com/office/drawing/2010/main" w="9525">
+              <a14:hiddenLine xmlns:a14="http://schemas.microsoft.com/office/drawing/2010/main" xmlns="" w="9525">
                 <a:solidFill>
                   <a:srgbClr val="000000"/>
                 </a:solidFill>
@@ -3881,14 +3934,14 @@
           </a:ln>
           <a:extLst>
             <a:ext uri="{909E8E84-426E-40dd-AFC4-6F175D3DCCD1}">
-              <a14:hiddenFill xmlns="" xmlns:a14="http://schemas.microsoft.com/office/drawing/2010/main">
+              <a14:hiddenFill xmlns:a14="http://schemas.microsoft.com/office/drawing/2010/main" xmlns="">
                 <a:solidFill>
                   <a:srgbClr val="FFFFFF"/>
                 </a:solidFill>
               </a14:hiddenFill>
             </a:ext>
             <a:ext uri="{91240B29-F687-4f45-9708-019B960494DF}">
-              <a14:hiddenLine xmlns="" xmlns:a14="http://schemas.microsoft.com/office/drawing/2010/main" w="9525">
+              <a14:hiddenLine xmlns:a14="http://schemas.microsoft.com/office/drawing/2010/main" xmlns="" w="9525">
                 <a:solidFill>
                   <a:srgbClr val="000000"/>
                 </a:solidFill>
@@ -4031,14 +4084,14 @@
           </a:ln>
           <a:extLst>
             <a:ext uri="{909E8E84-426E-40dd-AFC4-6F175D3DCCD1}">
-              <a14:hiddenFill xmlns:a14="http://schemas.microsoft.com/office/drawing/2010/main" xmlns="">
+              <a14:hiddenFill xmlns="" xmlns:a14="http://schemas.microsoft.com/office/drawing/2010/main">
                 <a:solidFill>
                   <a:srgbClr val="FFFFFF"/>
                 </a:solidFill>
               </a14:hiddenFill>
             </a:ext>
             <a:ext uri="{91240B29-F687-4f45-9708-019B960494DF}">
-              <a14:hiddenLine xmlns:a14="http://schemas.microsoft.com/office/drawing/2010/main" xmlns="" w="9525">
+              <a14:hiddenLine xmlns="" xmlns:a14="http://schemas.microsoft.com/office/drawing/2010/main" w="9525">
                 <a:solidFill>
                   <a:srgbClr val="000000"/>
                 </a:solidFill>
@@ -4369,7 +4422,7 @@
               </a14:hiddenLine>
             </a:ext>
             <a:ext uri="{FAA26D3D-D897-4be2-8F04-BA451C77F1D7}">
-              <ma14:placeholderFlag xmlns="" xmlns:ma14="http://schemas.microsoft.com/office/mac/drawingml/2011/main" val="1"/>
+              <ma14:placeholderFlag xmlns:ma14="http://schemas.microsoft.com/office/mac/drawingml/2011/main" xmlns="" val="1"/>
             </a:ext>
           </a:extLst>
         </p:spPr>
@@ -4575,7 +4628,7 @@
           </a:ln>
           <a:extLst>
             <a:ext uri="{FAA26D3D-D897-4be2-8F04-BA451C77F1D7}">
-              <ma14:placeholderFlag xmlns="" xmlns:ma14="http://schemas.microsoft.com/office/mac/drawingml/2011/main" val="1"/>
+              <ma14:placeholderFlag xmlns:ma14="http://schemas.microsoft.com/office/mac/drawingml/2011/main" xmlns="" val="1"/>
             </a:ext>
           </a:extLst>
         </p:spPr>
@@ -4948,7 +5001,7 @@
               </a14:hiddenLine>
             </a:ext>
             <a:ext uri="{FAA26D3D-D897-4be2-8F04-BA451C77F1D7}">
-              <ma14:placeholderFlag xmlns="" xmlns:ma14="http://schemas.microsoft.com/office/mac/drawingml/2011/main" val="1"/>
+              <ma14:placeholderFlag xmlns:ma14="http://schemas.microsoft.com/office/mac/drawingml/2011/main" xmlns="" val="1"/>
             </a:ext>
           </a:extLst>
         </p:spPr>
@@ -5528,7 +5581,7 @@
           </a:ln>
           <a:extLst>
             <a:ext uri="{FAA26D3D-D897-4be2-8F04-BA451C77F1D7}">
-              <ma14:placeholderFlag xmlns="" xmlns:ma14="http://schemas.microsoft.com/office/mac/drawingml/2011/main" val="1"/>
+              <ma14:placeholderFlag xmlns:ma14="http://schemas.microsoft.com/office/mac/drawingml/2011/main" xmlns="" val="1"/>
             </a:ext>
           </a:extLst>
         </p:spPr>
@@ -5835,7 +5888,7 @@
           </a:ln>
           <a:extLst>
             <a:ext uri="{FAA26D3D-D897-4be2-8F04-BA451C77F1D7}">
-              <ma14:placeholderFlag xmlns="" xmlns:ma14="http://schemas.microsoft.com/office/mac/drawingml/2011/main" val="1"/>
+              <ma14:placeholderFlag xmlns:ma14="http://schemas.microsoft.com/office/mac/drawingml/2011/main" xmlns="" val="1"/>
             </a:ext>
           </a:extLst>
         </p:spPr>
@@ -6106,7 +6159,7 @@
           </a:ln>
           <a:extLst>
             <a:ext uri="{FAA26D3D-D897-4be2-8F04-BA451C77F1D7}">
-              <ma14:placeholderFlag xmlns="" xmlns:ma14="http://schemas.microsoft.com/office/mac/drawingml/2011/main" val="1"/>
+              <ma14:placeholderFlag xmlns:ma14="http://schemas.microsoft.com/office/mac/drawingml/2011/main" xmlns="" val="1"/>
             </a:ext>
           </a:extLst>
         </p:spPr>
@@ -6349,7 +6402,7 @@
               </a14:hiddenLine>
             </a:ext>
             <a:ext uri="{FAA26D3D-D897-4be2-8F04-BA451C77F1D7}">
-              <ma14:placeholderFlag xmlns="" xmlns:ma14="http://schemas.microsoft.com/office/mac/drawingml/2011/main" val="1"/>
+              <ma14:placeholderFlag xmlns:ma14="http://schemas.microsoft.com/office/mac/drawingml/2011/main" xmlns="" val="1"/>
             </a:ext>
           </a:extLst>
         </p:spPr>
@@ -6628,7 +6681,7 @@
               </a14:hiddenLine>
             </a:ext>
             <a:ext uri="{FAA26D3D-D897-4be2-8F04-BA451C77F1D7}">
-              <ma14:placeholderFlag xmlns="" xmlns:ma14="http://schemas.microsoft.com/office/mac/drawingml/2011/main" val="1"/>
+              <ma14:placeholderFlag xmlns:ma14="http://schemas.microsoft.com/office/mac/drawingml/2011/main" xmlns="" val="1"/>
             </a:ext>
           </a:extLst>
         </p:spPr>
@@ -6901,7 +6954,7 @@
               </a14:hiddenLine>
             </a:ext>
             <a:ext uri="{FAA26D3D-D897-4be2-8F04-BA451C77F1D7}">
-              <ma14:placeholderFlag xmlns="" xmlns:ma14="http://schemas.microsoft.com/office/mac/drawingml/2011/main" val="1"/>
+              <ma14:placeholderFlag xmlns:ma14="http://schemas.microsoft.com/office/mac/drawingml/2011/main" xmlns="" val="1"/>
             </a:ext>
           </a:extLst>
         </p:spPr>
@@ -9424,7 +9477,7 @@
           <a:p>
             <a:fld id="{193A7D5E-D396-4762-A45A-E4DCF79C016E}" type="datetimeFigureOut">
               <a:rPr lang="en-US" smtClean="0"/>
-              <a:t>1/31/2021</a:t>
+              <a:t>2/13/2021</a:t>
             </a:fld>
             <a:endParaRPr lang="en-US"/>
           </a:p>
@@ -9622,7 +9675,7 @@
           <a:p>
             <a:fld id="{193A7D5E-D396-4762-A45A-E4DCF79C016E}" type="datetimeFigureOut">
               <a:rPr lang="en-US" smtClean="0"/>
-              <a:t>1/31/2021</a:t>
+              <a:t>2/13/2021</a:t>
             </a:fld>
             <a:endParaRPr lang="en-US"/>
           </a:p>
@@ -9897,7 +9950,7 @@
           <a:p>
             <a:fld id="{193A7D5E-D396-4762-A45A-E4DCF79C016E}" type="datetimeFigureOut">
               <a:rPr lang="en-US" smtClean="0"/>
-              <a:t>1/31/2021</a:t>
+              <a:t>2/13/2021</a:t>
             </a:fld>
             <a:endParaRPr lang="en-US"/>
           </a:p>
@@ -10289,7 +10342,7 @@
           <a:p>
             <a:fld id="{193A7D5E-D396-4762-A45A-E4DCF79C016E}" type="datetimeFigureOut">
               <a:rPr lang="en-US" smtClean="0"/>
-              <a:t>1/31/2021</a:t>
+              <a:t>2/13/2021</a:t>
             </a:fld>
             <a:endParaRPr lang="en-US"/>
           </a:p>
@@ -10701,7 +10754,7 @@
           <a:p>
             <a:fld id="{193A7D5E-D396-4762-A45A-E4DCF79C016E}" type="datetimeFigureOut">
               <a:rPr lang="en-US" smtClean="0"/>
-              <a:t>1/31/2021</a:t>
+              <a:t>2/13/2021</a:t>
             </a:fld>
             <a:endParaRPr lang="en-US"/>
           </a:p>
@@ -10842,7 +10895,7 @@
           <a:p>
             <a:fld id="{193A7D5E-D396-4762-A45A-E4DCF79C016E}" type="datetimeFigureOut">
               <a:rPr lang="en-US" smtClean="0"/>
-              <a:t>1/31/2021</a:t>
+              <a:t>2/13/2021</a:t>
             </a:fld>
             <a:endParaRPr lang="en-US"/>
           </a:p>
@@ -10955,7 +11008,7 @@
           <a:p>
             <a:fld id="{193A7D5E-D396-4762-A45A-E4DCF79C016E}" type="datetimeFigureOut">
               <a:rPr lang="en-US" smtClean="0"/>
-              <a:t>1/31/2021</a:t>
+              <a:t>2/13/2021</a:t>
             </a:fld>
             <a:endParaRPr lang="en-US"/>
           </a:p>
@@ -11266,7 +11319,7 @@
           <a:p>
             <a:fld id="{193A7D5E-D396-4762-A45A-E4DCF79C016E}" type="datetimeFigureOut">
               <a:rPr lang="en-US" smtClean="0"/>
-              <a:t>1/31/2021</a:t>
+              <a:t>2/13/2021</a:t>
             </a:fld>
             <a:endParaRPr lang="en-US"/>
           </a:p>
@@ -11554,7 +11607,7 @@
           <a:p>
             <a:fld id="{193A7D5E-D396-4762-A45A-E4DCF79C016E}" type="datetimeFigureOut">
               <a:rPr lang="en-US" smtClean="0"/>
-              <a:t>1/31/2021</a:t>
+              <a:t>2/13/2021</a:t>
             </a:fld>
             <a:endParaRPr lang="en-US"/>
           </a:p>
@@ -11752,7 +11805,7 @@
           <a:p>
             <a:fld id="{193A7D5E-D396-4762-A45A-E4DCF79C016E}" type="datetimeFigureOut">
               <a:rPr lang="en-US" smtClean="0"/>
-              <a:t>1/31/2021</a:t>
+              <a:t>2/13/2021</a:t>
             </a:fld>
             <a:endParaRPr lang="en-US"/>
           </a:p>
@@ -11960,7 +12013,7 @@
           <a:p>
             <a:fld id="{193A7D5E-D396-4762-A45A-E4DCF79C016E}" type="datetimeFigureOut">
               <a:rPr lang="en-US" smtClean="0"/>
-              <a:t>1/31/2021</a:t>
+              <a:t>2/13/2021</a:t>
             </a:fld>
             <a:endParaRPr lang="en-US"/>
           </a:p>
@@ -13057,7 +13110,7 @@
               </a14:hiddenLine>
             </a:ext>
             <a:ext uri="{FAA26D3D-D897-4be2-8F04-BA451C77F1D7}">
-              <ma14:placeholderFlag xmlns="" xmlns:ma14="http://schemas.microsoft.com/office/mac/drawingml/2011/main" val="1"/>
+              <ma14:placeholderFlag xmlns:ma14="http://schemas.microsoft.com/office/mac/drawingml/2011/main" xmlns="" val="1"/>
             </a:ext>
           </a:extLst>
         </p:spPr>
@@ -13812,7 +13865,7 @@
           <a:p>
             <a:fld id="{193A7D5E-D396-4762-A45A-E4DCF79C016E}" type="datetimeFigureOut">
               <a:rPr lang="en-US" smtClean="0"/>
-              <a:t>1/31/2021</a:t>
+              <a:t>2/13/2021</a:t>
             </a:fld>
             <a:endParaRPr lang="en-US"/>
           </a:p>
@@ -15016,7 +15069,7 @@
 </file>
 
 <file path=ppt/slides/slide3.xml><?xml version="1.0" encoding="utf-8"?>
-<p:sld xmlns:a="http://schemas.openxmlformats.org/drawingml/2006/main" xmlns:r="http://schemas.openxmlformats.org/officeDocument/2006/relationships" xmlns:p="http://schemas.openxmlformats.org/presentationml/2006/main">
+<p:sld xmlns:a="http://schemas.openxmlformats.org/drawingml/2006/main" xmlns:r="http://schemas.openxmlformats.org/officeDocument/2006/relationships" xmlns:p="http://schemas.openxmlformats.org/presentationml/2006/main" show="0">
   <p:cSld>
     <p:spTree>
       <p:nvGrpSpPr>
@@ -17748,6 +17801,685 @@
     <p:extLst>
       <p:ext uri="{BB962C8B-B14F-4D97-AF65-F5344CB8AC3E}">
         <p14:creationId xmlns:p14="http://schemas.microsoft.com/office/powerpoint/2010/main" val="2733106043"/>
+      </p:ext>
+    </p:extLst>
+  </p:cSld>
+  <p:clrMapOvr>
+    <a:masterClrMapping/>
+  </p:clrMapOvr>
+</p:sld>
+</file>
+
+<file path=ppt/slides/slide4.xml><?xml version="1.0" encoding="utf-8"?>
+<p:sld xmlns:a="http://schemas.openxmlformats.org/drawingml/2006/main" xmlns:r="http://schemas.openxmlformats.org/officeDocument/2006/relationships" xmlns:p="http://schemas.openxmlformats.org/presentationml/2006/main">
+  <p:cSld>
+    <p:spTree>
+      <p:nvGrpSpPr>
+        <p:cNvPr id="1" name=""/>
+        <p:cNvGrpSpPr/>
+        <p:nvPr/>
+      </p:nvGrpSpPr>
+      <p:grpSpPr>
+        <a:xfrm>
+          <a:off x="0" y="0"/>
+          <a:ext cx="0" cy="0"/>
+          <a:chOff x="0" y="0"/>
+          <a:chExt cx="0" cy="0"/>
+        </a:xfrm>
+      </p:grpSpPr>
+      <p:pic>
+        <p:nvPicPr>
+          <p:cNvPr id="3" name="Picture 2">
+            <a:extLst>
+              <a:ext uri="{FF2B5EF4-FFF2-40B4-BE49-F238E27FC236}">
+                <a16:creationId xmlns:a16="http://schemas.microsoft.com/office/drawing/2014/main" id="{460D997F-CF66-46D8-986C-B615DCEFFDF6}"/>
+              </a:ext>
+            </a:extLst>
+          </p:cNvPr>
+          <p:cNvPicPr>
+            <a:picLocks noChangeAspect="1"/>
+          </p:cNvPicPr>
+          <p:nvPr/>
+        </p:nvPicPr>
+        <p:blipFill>
+          <a:blip r:embed="rId2"/>
+          <a:stretch>
+            <a:fillRect/>
+          </a:stretch>
+        </p:blipFill>
+        <p:spPr>
+          <a:xfrm>
+            <a:off x="0" y="724234"/>
+            <a:ext cx="9144000" cy="2102713"/>
+          </a:xfrm>
+          <a:prstGeom prst="rect">
+            <a:avLst/>
+          </a:prstGeom>
+        </p:spPr>
+      </p:pic>
+      <p:cxnSp>
+        <p:nvCxnSpPr>
+          <p:cNvPr id="5" name="Straight Connector 4">
+            <a:extLst>
+              <a:ext uri="{FF2B5EF4-FFF2-40B4-BE49-F238E27FC236}">
+                <a16:creationId xmlns:a16="http://schemas.microsoft.com/office/drawing/2014/main" id="{10252BED-8989-485F-B2DD-E0A61CDDD8AE}"/>
+              </a:ext>
+            </a:extLst>
+          </p:cNvPr>
+          <p:cNvCxnSpPr/>
+          <p:nvPr/>
+        </p:nvCxnSpPr>
+        <p:spPr>
+          <a:xfrm>
+            <a:off x="2128345" y="1775590"/>
+            <a:ext cx="0" cy="1442545"/>
+          </a:xfrm>
+          <a:prstGeom prst="line">
+            <a:avLst/>
+          </a:prstGeom>
+          <a:ln w="12700">
+            <a:solidFill>
+              <a:srgbClr val="FF0000"/>
+            </a:solidFill>
+          </a:ln>
+        </p:spPr>
+        <p:style>
+          <a:lnRef idx="1">
+            <a:schemeClr val="accent1"/>
+          </a:lnRef>
+          <a:fillRef idx="0">
+            <a:schemeClr val="accent1"/>
+          </a:fillRef>
+          <a:effectRef idx="0">
+            <a:schemeClr val="accent1"/>
+          </a:effectRef>
+          <a:fontRef idx="minor">
+            <a:schemeClr val="tx1"/>
+          </a:fontRef>
+        </p:style>
+      </p:cxnSp>
+      <p:cxnSp>
+        <p:nvCxnSpPr>
+          <p:cNvPr id="6" name="Straight Connector 5">
+            <a:extLst>
+              <a:ext uri="{FF2B5EF4-FFF2-40B4-BE49-F238E27FC236}">
+                <a16:creationId xmlns:a16="http://schemas.microsoft.com/office/drawing/2014/main" id="{A196DB49-60D8-4D71-A86E-A027FE6FAB0B}"/>
+              </a:ext>
+            </a:extLst>
+          </p:cNvPr>
+          <p:cNvCxnSpPr/>
+          <p:nvPr/>
+        </p:nvCxnSpPr>
+        <p:spPr>
+          <a:xfrm>
+            <a:off x="2687145" y="1775590"/>
+            <a:ext cx="0" cy="1442545"/>
+          </a:xfrm>
+          <a:prstGeom prst="line">
+            <a:avLst/>
+          </a:prstGeom>
+          <a:ln w="12700">
+            <a:solidFill>
+              <a:srgbClr val="FF0000"/>
+            </a:solidFill>
+          </a:ln>
+        </p:spPr>
+        <p:style>
+          <a:lnRef idx="1">
+            <a:schemeClr val="accent1"/>
+          </a:lnRef>
+          <a:fillRef idx="0">
+            <a:schemeClr val="accent1"/>
+          </a:fillRef>
+          <a:effectRef idx="0">
+            <a:schemeClr val="accent1"/>
+          </a:effectRef>
+          <a:fontRef idx="minor">
+            <a:schemeClr val="tx1"/>
+          </a:fontRef>
+        </p:style>
+      </p:cxnSp>
+      <p:cxnSp>
+        <p:nvCxnSpPr>
+          <p:cNvPr id="7" name="Straight Connector 6">
+            <a:extLst>
+              <a:ext uri="{FF2B5EF4-FFF2-40B4-BE49-F238E27FC236}">
+                <a16:creationId xmlns:a16="http://schemas.microsoft.com/office/drawing/2014/main" id="{1363FF80-AC37-4BFE-822B-6D8B8E52A48B}"/>
+              </a:ext>
+            </a:extLst>
+          </p:cNvPr>
+          <p:cNvCxnSpPr/>
+          <p:nvPr/>
+        </p:nvCxnSpPr>
+        <p:spPr>
+          <a:xfrm>
+            <a:off x="3250178" y="1775589"/>
+            <a:ext cx="0" cy="1442545"/>
+          </a:xfrm>
+          <a:prstGeom prst="line">
+            <a:avLst/>
+          </a:prstGeom>
+          <a:ln w="12700">
+            <a:solidFill>
+              <a:srgbClr val="FF0000"/>
+            </a:solidFill>
+          </a:ln>
+        </p:spPr>
+        <p:style>
+          <a:lnRef idx="1">
+            <a:schemeClr val="accent1"/>
+          </a:lnRef>
+          <a:fillRef idx="0">
+            <a:schemeClr val="accent1"/>
+          </a:fillRef>
+          <a:effectRef idx="0">
+            <a:schemeClr val="accent1"/>
+          </a:effectRef>
+          <a:fontRef idx="minor">
+            <a:schemeClr val="tx1"/>
+          </a:fontRef>
+        </p:style>
+      </p:cxnSp>
+      <p:cxnSp>
+        <p:nvCxnSpPr>
+          <p:cNvPr id="8" name="Straight Connector 7">
+            <a:extLst>
+              <a:ext uri="{FF2B5EF4-FFF2-40B4-BE49-F238E27FC236}">
+                <a16:creationId xmlns:a16="http://schemas.microsoft.com/office/drawing/2014/main" id="{203FD3B3-FE90-4B84-B43E-EE53F1B6BCB6}"/>
+              </a:ext>
+            </a:extLst>
+          </p:cNvPr>
+          <p:cNvCxnSpPr/>
+          <p:nvPr/>
+        </p:nvCxnSpPr>
+        <p:spPr>
+          <a:xfrm>
+            <a:off x="3821679" y="1741722"/>
+            <a:ext cx="0" cy="1442545"/>
+          </a:xfrm>
+          <a:prstGeom prst="line">
+            <a:avLst/>
+          </a:prstGeom>
+          <a:ln w="12700">
+            <a:solidFill>
+              <a:srgbClr val="FF0000"/>
+            </a:solidFill>
+          </a:ln>
+        </p:spPr>
+        <p:style>
+          <a:lnRef idx="1">
+            <a:schemeClr val="accent1"/>
+          </a:lnRef>
+          <a:fillRef idx="0">
+            <a:schemeClr val="accent1"/>
+          </a:fillRef>
+          <a:effectRef idx="0">
+            <a:schemeClr val="accent1"/>
+          </a:effectRef>
+          <a:fontRef idx="minor">
+            <a:schemeClr val="tx1"/>
+          </a:fontRef>
+        </p:style>
+      </p:cxnSp>
+      <p:cxnSp>
+        <p:nvCxnSpPr>
+          <p:cNvPr id="9" name="Straight Connector 8">
+            <a:extLst>
+              <a:ext uri="{FF2B5EF4-FFF2-40B4-BE49-F238E27FC236}">
+                <a16:creationId xmlns:a16="http://schemas.microsoft.com/office/drawing/2014/main" id="{23C46B43-B893-45FD-8663-49B7232A37D6}"/>
+              </a:ext>
+            </a:extLst>
+          </p:cNvPr>
+          <p:cNvCxnSpPr/>
+          <p:nvPr/>
+        </p:nvCxnSpPr>
+        <p:spPr>
+          <a:xfrm>
+            <a:off x="4372012" y="1741722"/>
+            <a:ext cx="0" cy="1442545"/>
+          </a:xfrm>
+          <a:prstGeom prst="line">
+            <a:avLst/>
+          </a:prstGeom>
+          <a:ln w="12700">
+            <a:solidFill>
+              <a:srgbClr val="FF0000"/>
+            </a:solidFill>
+          </a:ln>
+        </p:spPr>
+        <p:style>
+          <a:lnRef idx="1">
+            <a:schemeClr val="accent1"/>
+          </a:lnRef>
+          <a:fillRef idx="0">
+            <a:schemeClr val="accent1"/>
+          </a:fillRef>
+          <a:effectRef idx="0">
+            <a:schemeClr val="accent1"/>
+          </a:effectRef>
+          <a:fontRef idx="minor">
+            <a:schemeClr val="tx1"/>
+          </a:fontRef>
+        </p:style>
+      </p:cxnSp>
+      <p:cxnSp>
+        <p:nvCxnSpPr>
+          <p:cNvPr id="10" name="Straight Connector 9">
+            <a:extLst>
+              <a:ext uri="{FF2B5EF4-FFF2-40B4-BE49-F238E27FC236}">
+                <a16:creationId xmlns:a16="http://schemas.microsoft.com/office/drawing/2014/main" id="{2B4FCEB1-5344-46CD-AF03-35432A66083B}"/>
+              </a:ext>
+            </a:extLst>
+          </p:cNvPr>
+          <p:cNvCxnSpPr/>
+          <p:nvPr/>
+        </p:nvCxnSpPr>
+        <p:spPr>
+          <a:xfrm>
+            <a:off x="4926578" y="1741721"/>
+            <a:ext cx="0" cy="1442545"/>
+          </a:xfrm>
+          <a:prstGeom prst="line">
+            <a:avLst/>
+          </a:prstGeom>
+          <a:ln w="12700">
+            <a:solidFill>
+              <a:srgbClr val="FF0000"/>
+            </a:solidFill>
+          </a:ln>
+        </p:spPr>
+        <p:style>
+          <a:lnRef idx="1">
+            <a:schemeClr val="accent1"/>
+          </a:lnRef>
+          <a:fillRef idx="0">
+            <a:schemeClr val="accent1"/>
+          </a:fillRef>
+          <a:effectRef idx="0">
+            <a:schemeClr val="accent1"/>
+          </a:effectRef>
+          <a:fontRef idx="minor">
+            <a:schemeClr val="tx1"/>
+          </a:fontRef>
+        </p:style>
+      </p:cxnSp>
+      <p:cxnSp>
+        <p:nvCxnSpPr>
+          <p:cNvPr id="11" name="Straight Connector 10">
+            <a:extLst>
+              <a:ext uri="{FF2B5EF4-FFF2-40B4-BE49-F238E27FC236}">
+                <a16:creationId xmlns:a16="http://schemas.microsoft.com/office/drawing/2014/main" id="{16808760-DAC0-430F-B774-AF8C1C37A23C}"/>
+              </a:ext>
+            </a:extLst>
+          </p:cNvPr>
+          <p:cNvCxnSpPr/>
+          <p:nvPr/>
+        </p:nvCxnSpPr>
+        <p:spPr>
+          <a:xfrm>
+            <a:off x="5489611" y="1741720"/>
+            <a:ext cx="0" cy="1442545"/>
+          </a:xfrm>
+          <a:prstGeom prst="line">
+            <a:avLst/>
+          </a:prstGeom>
+          <a:ln w="12700">
+            <a:solidFill>
+              <a:srgbClr val="FF0000"/>
+            </a:solidFill>
+          </a:ln>
+        </p:spPr>
+        <p:style>
+          <a:lnRef idx="1">
+            <a:schemeClr val="accent1"/>
+          </a:lnRef>
+          <a:fillRef idx="0">
+            <a:schemeClr val="accent1"/>
+          </a:fillRef>
+          <a:effectRef idx="0">
+            <a:schemeClr val="accent1"/>
+          </a:effectRef>
+          <a:fontRef idx="minor">
+            <a:schemeClr val="tx1"/>
+          </a:fontRef>
+        </p:style>
+      </p:cxnSp>
+      <p:cxnSp>
+        <p:nvCxnSpPr>
+          <p:cNvPr id="12" name="Straight Connector 11">
+            <a:extLst>
+              <a:ext uri="{FF2B5EF4-FFF2-40B4-BE49-F238E27FC236}">
+                <a16:creationId xmlns:a16="http://schemas.microsoft.com/office/drawing/2014/main" id="{2F5A12B0-1E62-4FC2-ADF2-357C285F135F}"/>
+              </a:ext>
+            </a:extLst>
+          </p:cNvPr>
+          <p:cNvCxnSpPr/>
+          <p:nvPr/>
+        </p:nvCxnSpPr>
+        <p:spPr>
+          <a:xfrm>
+            <a:off x="6048411" y="1741719"/>
+            <a:ext cx="0" cy="1442545"/>
+          </a:xfrm>
+          <a:prstGeom prst="line">
+            <a:avLst/>
+          </a:prstGeom>
+          <a:ln w="12700">
+            <a:solidFill>
+              <a:srgbClr val="FF0000"/>
+            </a:solidFill>
+          </a:ln>
+        </p:spPr>
+        <p:style>
+          <a:lnRef idx="1">
+            <a:schemeClr val="accent1"/>
+          </a:lnRef>
+          <a:fillRef idx="0">
+            <a:schemeClr val="accent1"/>
+          </a:fillRef>
+          <a:effectRef idx="0">
+            <a:schemeClr val="accent1"/>
+          </a:effectRef>
+          <a:fontRef idx="minor">
+            <a:schemeClr val="tx1"/>
+          </a:fontRef>
+        </p:style>
+      </p:cxnSp>
+      <p:cxnSp>
+        <p:nvCxnSpPr>
+          <p:cNvPr id="13" name="Straight Connector 12">
+            <a:extLst>
+              <a:ext uri="{FF2B5EF4-FFF2-40B4-BE49-F238E27FC236}">
+                <a16:creationId xmlns:a16="http://schemas.microsoft.com/office/drawing/2014/main" id="{F0774017-276E-4307-85FF-8CDDE3F8E12F}"/>
+              </a:ext>
+            </a:extLst>
+          </p:cNvPr>
+          <p:cNvCxnSpPr/>
+          <p:nvPr/>
+        </p:nvCxnSpPr>
+        <p:spPr>
+          <a:xfrm>
+            <a:off x="6607211" y="1741719"/>
+            <a:ext cx="0" cy="1442545"/>
+          </a:xfrm>
+          <a:prstGeom prst="line">
+            <a:avLst/>
+          </a:prstGeom>
+          <a:ln w="12700">
+            <a:solidFill>
+              <a:srgbClr val="FF0000"/>
+            </a:solidFill>
+          </a:ln>
+        </p:spPr>
+        <p:style>
+          <a:lnRef idx="1">
+            <a:schemeClr val="accent1"/>
+          </a:lnRef>
+          <a:fillRef idx="0">
+            <a:schemeClr val="accent1"/>
+          </a:fillRef>
+          <a:effectRef idx="0">
+            <a:schemeClr val="accent1"/>
+          </a:effectRef>
+          <a:fontRef idx="minor">
+            <a:schemeClr val="tx1"/>
+          </a:fontRef>
+        </p:style>
+      </p:cxnSp>
+      <p:cxnSp>
+        <p:nvCxnSpPr>
+          <p:cNvPr id="14" name="Straight Connector 13">
+            <a:extLst>
+              <a:ext uri="{FF2B5EF4-FFF2-40B4-BE49-F238E27FC236}">
+                <a16:creationId xmlns:a16="http://schemas.microsoft.com/office/drawing/2014/main" id="{1B4BDD60-9908-4CC8-8272-D13ECDC31CFA}"/>
+              </a:ext>
+            </a:extLst>
+          </p:cNvPr>
+          <p:cNvCxnSpPr/>
+          <p:nvPr/>
+        </p:nvCxnSpPr>
+        <p:spPr>
+          <a:xfrm>
+            <a:off x="7170244" y="1741719"/>
+            <a:ext cx="0" cy="1442545"/>
+          </a:xfrm>
+          <a:prstGeom prst="line">
+            <a:avLst/>
+          </a:prstGeom>
+          <a:ln w="12700">
+            <a:solidFill>
+              <a:srgbClr val="FF0000"/>
+            </a:solidFill>
+          </a:ln>
+        </p:spPr>
+        <p:style>
+          <a:lnRef idx="1">
+            <a:schemeClr val="accent1"/>
+          </a:lnRef>
+          <a:fillRef idx="0">
+            <a:schemeClr val="accent1"/>
+          </a:fillRef>
+          <a:effectRef idx="0">
+            <a:schemeClr val="accent1"/>
+          </a:effectRef>
+          <a:fontRef idx="minor">
+            <a:schemeClr val="tx1"/>
+          </a:fontRef>
+        </p:style>
+      </p:cxnSp>
+      <p:cxnSp>
+        <p:nvCxnSpPr>
+          <p:cNvPr id="15" name="Straight Connector 14">
+            <a:extLst>
+              <a:ext uri="{FF2B5EF4-FFF2-40B4-BE49-F238E27FC236}">
+                <a16:creationId xmlns:a16="http://schemas.microsoft.com/office/drawing/2014/main" id="{CA90D8AB-5F67-43B6-BB51-D9118E4C0E57}"/>
+              </a:ext>
+            </a:extLst>
+          </p:cNvPr>
+          <p:cNvCxnSpPr/>
+          <p:nvPr/>
+        </p:nvCxnSpPr>
+        <p:spPr>
+          <a:xfrm>
+            <a:off x="7733277" y="1741719"/>
+            <a:ext cx="0" cy="1442545"/>
+          </a:xfrm>
+          <a:prstGeom prst="line">
+            <a:avLst/>
+          </a:prstGeom>
+          <a:ln w="12700">
+            <a:solidFill>
+              <a:srgbClr val="FF0000"/>
+            </a:solidFill>
+          </a:ln>
+        </p:spPr>
+        <p:style>
+          <a:lnRef idx="1">
+            <a:schemeClr val="accent1"/>
+          </a:lnRef>
+          <a:fillRef idx="0">
+            <a:schemeClr val="accent1"/>
+          </a:fillRef>
+          <a:effectRef idx="0">
+            <a:schemeClr val="accent1"/>
+          </a:effectRef>
+          <a:fontRef idx="minor">
+            <a:schemeClr val="tx1"/>
+          </a:fontRef>
+        </p:style>
+      </p:cxnSp>
+      <p:cxnSp>
+        <p:nvCxnSpPr>
+          <p:cNvPr id="16" name="Straight Connector 15">
+            <a:extLst>
+              <a:ext uri="{FF2B5EF4-FFF2-40B4-BE49-F238E27FC236}">
+                <a16:creationId xmlns:a16="http://schemas.microsoft.com/office/drawing/2014/main" id="{B369316A-EBA4-438C-976E-9C4C32F26A33}"/>
+              </a:ext>
+            </a:extLst>
+          </p:cNvPr>
+          <p:cNvCxnSpPr/>
+          <p:nvPr/>
+        </p:nvCxnSpPr>
+        <p:spPr>
+          <a:xfrm>
+            <a:off x="8296310" y="1741718"/>
+            <a:ext cx="0" cy="1442545"/>
+          </a:xfrm>
+          <a:prstGeom prst="line">
+            <a:avLst/>
+          </a:prstGeom>
+          <a:ln w="12700">
+            <a:solidFill>
+              <a:srgbClr val="FF0000"/>
+            </a:solidFill>
+          </a:ln>
+        </p:spPr>
+        <p:style>
+          <a:lnRef idx="1">
+            <a:schemeClr val="accent1"/>
+          </a:lnRef>
+          <a:fillRef idx="0">
+            <a:schemeClr val="accent1"/>
+          </a:fillRef>
+          <a:effectRef idx="0">
+            <a:schemeClr val="accent1"/>
+          </a:effectRef>
+          <a:fontRef idx="minor">
+            <a:schemeClr val="tx1"/>
+          </a:fontRef>
+        </p:style>
+      </p:cxnSp>
+      <p:cxnSp>
+        <p:nvCxnSpPr>
+          <p:cNvPr id="17" name="Straight Connector 16">
+            <a:extLst>
+              <a:ext uri="{FF2B5EF4-FFF2-40B4-BE49-F238E27FC236}">
+                <a16:creationId xmlns:a16="http://schemas.microsoft.com/office/drawing/2014/main" id="{2BB0BA8F-0E4A-45C0-B0BF-87BF37315A39}"/>
+              </a:ext>
+            </a:extLst>
+          </p:cNvPr>
+          <p:cNvCxnSpPr/>
+          <p:nvPr/>
+        </p:nvCxnSpPr>
+        <p:spPr>
+          <a:xfrm>
+            <a:off x="8723877" y="1775589"/>
+            <a:ext cx="0" cy="1442545"/>
+          </a:xfrm>
+          <a:prstGeom prst="line">
+            <a:avLst/>
+          </a:prstGeom>
+          <a:ln w="12700">
+            <a:solidFill>
+              <a:srgbClr val="FF0000"/>
+            </a:solidFill>
+          </a:ln>
+        </p:spPr>
+        <p:style>
+          <a:lnRef idx="1">
+            <a:schemeClr val="accent1"/>
+          </a:lnRef>
+          <a:fillRef idx="0">
+            <a:schemeClr val="accent1"/>
+          </a:fillRef>
+          <a:effectRef idx="0">
+            <a:schemeClr val="accent1"/>
+          </a:effectRef>
+          <a:fontRef idx="minor">
+            <a:schemeClr val="tx1"/>
+          </a:fontRef>
+        </p:style>
+      </p:cxnSp>
+      <mc:AlternateContent xmlns:mc="http://schemas.openxmlformats.org/markup-compatibility/2006">
+        <mc:Choice xmlns:p14="http://schemas.microsoft.com/office/powerpoint/2010/main" Requires="p14">
+          <p:contentPart p14:bwMode="auto" r:id="rId3">
+            <p14:nvContentPartPr>
+              <p14:cNvPr id="18" name="Ink 17">
+                <a:extLst>
+                  <a:ext uri="{FF2B5EF4-FFF2-40B4-BE49-F238E27FC236}">
+                    <a16:creationId xmlns:a16="http://schemas.microsoft.com/office/drawing/2014/main" id="{25C59AF8-1DE6-40E7-AFA6-4A16C8A52C7D}"/>
+                  </a:ext>
+                </a:extLst>
+              </p14:cNvPr>
+              <p14:cNvContentPartPr/>
+              <p14:nvPr/>
+            </p14:nvContentPartPr>
+            <p14:xfrm>
+              <a:off x="2347920" y="1542960"/>
+              <a:ext cx="5762880" cy="1081440"/>
+            </p14:xfrm>
+          </p:contentPart>
+        </mc:Choice>
+        <mc:Fallback>
+          <p:pic>
+            <p:nvPicPr>
+              <p:cNvPr id="18" name="Ink 17">
+                <a:extLst>
+                  <a:ext uri="{FF2B5EF4-FFF2-40B4-BE49-F238E27FC236}">
+                    <a16:creationId xmlns:a16="http://schemas.microsoft.com/office/drawing/2014/main" id="{25C59AF8-1DE6-40E7-AFA6-4A16C8A52C7D}"/>
+                  </a:ext>
+                </a:extLst>
+              </p:cNvPr>
+              <p:cNvPicPr/>
+              <p:nvPr/>
+            </p:nvPicPr>
+            <p:blipFill>
+              <a:blip r:embed="rId4"/>
+              <a:stretch>
+                <a:fillRect/>
+              </a:stretch>
+            </p:blipFill>
+            <p:spPr>
+              <a:xfrm>
+                <a:off x="2338560" y="1533600"/>
+                <a:ext cx="5781600" cy="1100160"/>
+              </a:xfrm>
+              <a:prstGeom prst="rect">
+                <a:avLst/>
+              </a:prstGeom>
+            </p:spPr>
+          </p:pic>
+        </mc:Fallback>
+      </mc:AlternateContent>
+      <p:sp>
+        <p:nvSpPr>
+          <p:cNvPr id="19" name="TextBox 18">
+            <a:extLst>
+              <a:ext uri="{FF2B5EF4-FFF2-40B4-BE49-F238E27FC236}">
+                <a16:creationId xmlns:a16="http://schemas.microsoft.com/office/drawing/2014/main" id="{CC64F8BD-698C-40BD-9933-388124E8CAF8}"/>
+              </a:ext>
+            </a:extLst>
+          </p:cNvPr>
+          <p:cNvSpPr txBox="1"/>
+          <p:nvPr/>
+        </p:nvSpPr>
+        <p:spPr>
+          <a:xfrm>
+            <a:off x="118836" y="13890"/>
+            <a:ext cx="2362199" cy="369332"/>
+          </a:xfrm>
+          <a:prstGeom prst="rect">
+            <a:avLst/>
+          </a:prstGeom>
+          <a:noFill/>
+        </p:spPr>
+        <p:txBody>
+          <a:bodyPr wrap="square" rtlCol="0">
+            <a:spAutoFit/>
+          </a:bodyPr>
+          <a:lstStyle/>
+          <a:p>
+            <a:r>
+              <a:rPr lang="en-US" dirty="0"/>
+              <a:t>I2C Master</a:t>
+            </a:r>
+          </a:p>
+        </p:txBody>
+      </p:sp>
+    </p:spTree>
+    <p:extLst>
+      <p:ext uri="{BB962C8B-B14F-4D97-AF65-F5344CB8AC3E}">
+        <p14:creationId xmlns:p14="http://schemas.microsoft.com/office/powerpoint/2010/main" val="3449446057"/>
       </p:ext>
     </p:extLst>
   </p:cSld>

</xml_diff>

<commit_message>
Stop signal corrections added and final result updated in ppt
</commit_message>
<xml_diff>
--- a/I2C/I2C_implementation_Summary.pptx
+++ b/I2C/I2C_implementation_Summary.pptx
@@ -8,8 +8,12 @@
   <p:sldIdLst>
     <p:sldId id="265" r:id="rId3"/>
     <p:sldId id="257" r:id="rId4"/>
-    <p:sldId id="267" r:id="rId5"/>
-    <p:sldId id="282" r:id="rId6"/>
+    <p:sldId id="283" r:id="rId5"/>
+    <p:sldId id="285" r:id="rId6"/>
+    <p:sldId id="297" r:id="rId7"/>
+    <p:sldId id="298" r:id="rId8"/>
+    <p:sldId id="284" r:id="rId9"/>
+    <p:sldId id="267" r:id="rId10"/>
   </p:sldIdLst>
   <p:sldSz cx="9144000" cy="5143500" type="screen16x9"/>
   <p:notesSz cx="6858000" cy="9144000"/>
@@ -158,58 +162,6 @@
     </p:ext>
   </p:extLst>
 </p:presentation>
-</file>
-
-<file path=ppt/ink/ink1.xml><?xml version="1.0" encoding="utf-8"?>
-<inkml:ink xmlns:inkml="http://www.w3.org/2003/InkML">
-  <inkml:definitions>
-    <inkml:context xml:id="ctx0">
-      <inkml:inkSource xml:id="inkSrc0">
-        <inkml:traceFormat>
-          <inkml:channel name="X" type="integer" max="1920" units="cm"/>
-          <inkml:channel name="Y" type="integer" max="1080" units="cm"/>
-          <inkml:channel name="T" type="integer" max="2.14748E9" units="dev"/>
-        </inkml:traceFormat>
-        <inkml:channelProperties>
-          <inkml:channelProperty channel="X" name="resolution" value="62.13592" units="1/cm"/>
-          <inkml:channelProperty channel="Y" name="resolution" value="62.06897" units="1/cm"/>
-          <inkml:channelProperty channel="T" name="resolution" value="1" units="1/dev"/>
-        </inkml:channelProperties>
-      </inkml:inkSource>
-      <inkml:timestamp xml:id="ts0" timeString="2021-02-13T12:49:58.090"/>
-    </inkml:context>
-    <inkml:brush xml:id="br0">
-      <inkml:brushProperty name="width" value="0.05292" units="cm"/>
-      <inkml:brushProperty name="height" value="0.05292" units="cm"/>
-      <inkml:brushProperty name="color" value="#FF0000"/>
-    </inkml:brush>
-  </inkml:definitions>
-  <inkml:trace contextRef="#ctx0" brushRef="#br0">8453 4617 0,'14'26'109,"-1"-12"-93,-13-1 31,0 13-16,0-12 0,0-1 1,0 0-1,0 13-31,13 1 16,-13-14 15,0 14-31,0-14 15,0 0 1,0 0 0,0 27 15,0-27 16,13 0-32,1 1 1,25 12 0,-39-13-1,0 1 1</inkml:trace>
-  <inkml:trace contextRef="#ctx0" brushRef="#br0" timeOffset="2777.45">9988 4670 0,'13'0'47,"14"0"-47,-14 0 16,0 0-1,0 0 48,1 13 78,-1-13-141,0 13 15,0 1 1,1 12 15,-14-13 16,13 0-47,-13 14 31,0-14-15,0 0-1,0 1 1,0 25 0,0-25-1,0 12 1,0-13-16,-27 0 16,14 1-1,0-1 1,0 0 124,13 0-61,39-13-64,14 0 1,-26 0-1,-14 0 1,27 0 15,-27 0-15,0 0 15,0 0-15,14 0-1,-1 0 1,-13 0 0</inkml:trace>
-  <inkml:trace contextRef="#ctx0" brushRef="#br0" timeOffset="5446.64">11483 4551 0,'13'0'109,"27"0"-109,-27 0 16,14 0-16,12 0 15,-12 0 1,52 0-1,-66 0 1,14 0 31,-14 0-16,0 0 32,-13 13-48,0 14 17,-13-14-17,0 0 1,0 0-1,-1 0 1,1 1 0,0 12 15,-14-13-15,1-13-1,13 14 1,-1-1 15,14 0 219,14-13-234,-1 0 62,40 13-78,-40-13 15,27 0 1,-27 13 0,0-13-16,27 27 15,-27-27 1,27 13 46,-27 0-30,0-13-32,0 14 47,-13-1-32,0 0 16,0 0-15,0 1-16,0 12 16,0-13-16,0 27 15,-13-27 1,0 0 0,-40 14-1,40-14 16,-14-13-15,-25 13 0,25-13 15,14 0-15,-27 0-1,-13 0 1,40 0-1,-27 0 110,27 0-125,0 0 16,-14 0 0</inkml:trace>
-  <inkml:trace contextRef="#ctx0" brushRef="#br0" timeOffset="8791.12">13031 4524 0,'0'40'63,"0"-27"-63,-13 14 16,13-1-1,-27 14-15,1 13 31,26-40 141,0 0-156,0 0-16,-14 27 31,14-27 0,-13 27-15,53-40 187,-14 0-187,27 0-1,-26 0 1,-14 0 93,-13-13-30,0-14 14,0 14-77,0 40 281,0-14-282,0 13-15,0-12 16,0 12 0,0 0-1,0-12 1,0-1 0,0 0 77,0 14-77,0-14 0,0 0-1</inkml:trace>
-  <inkml:trace contextRef="#ctx0" brushRef="#br0" timeOffset="11984.51">14473 4524 0,'13'0'125,"0"0"-125,0 0 16,14 0 15,-14 0 0,14-13 63,-14 0 0,0 13 31,0 0-110,0 0 1,-26 0 203,0 0-204,-13 13 1,-1-13 0,14 0-1,-40 13-15,26 14 32,-39-14-17,53-13 1,0 13-1,0 1 17,13 12 155,0-13-171,13 14-16,13 12 31,-26-25-15,14-1 93,-1-13-78,13 0 1,-13-13-17,1 13 1,39 0-16,-27 0 31,14 0-15,-27 0-16,13 0 15,27 0 32,-39 0-31,-1 0 46,0 0-62,-13 13 16,0 0 0,0 40-1,0-40 1,0 0-1,0 1 1,-26 25 15,12-39-31,1 14 16,-13-1 0,-1-13-1,14 13 1,0-13 15,-40 0-15,-53 0-1,27 40 1,65-40 0,-12 0 15,13 0 47</inkml:trace>
-  <inkml:trace contextRef="#ctx0" brushRef="#br0" timeOffset="14303.21">16060 4485 0,'0'53'31,"0"-40"-31,0 0 32,-13 14-17,13-14 1,0 0 15,0 0-15,0 0 46,0 14-46,0-14-1,0 0 48,0 1-47,13 38-16,0-38 31,1-1-16,12 0 95,-13-13-95,1 0-15,12 0 16,14 27 0,-27-27-1,13 0 48,-12-14-48,-1 1 1,-13 0 31,0 0-16,0-1 47,0 1 63,0 0-125,-13-13 15,-1 26 0,-12 0-31,13 0 16,-1 0-1,1 0-15,-53 0 16,53 0 0</inkml:trace>
-  <inkml:trace contextRef="#ctx0" brushRef="#br0" timeOffset="16680.11">17370 4564 0,'40'0'110,"-14"0"-95,0 0 1,41 0 0,-41 13 187,-26 1-188,0 12 1,0-13 0,0 27-1,0-14 1,0 14-1,0-27-15,0 0 32,0 1-17,0 12 1,0-13 0,0 1 15</inkml:trace>
-  <inkml:trace contextRef="#ctx0" brushRef="#br0" timeOffset="19319.02">19037 4551 0,'-13'-13'16,"-1"13"15,1 0 0,0 13-15,13 0 0,0 0-1,0 27 1,0-27-1,0 0 1,0 1 0,0 12-1,26 1 188,1-1-187,12-26 0,-25 13-1,-1 0 95,-13 1-95,13-1 1,-13 0 0,0 14-16,0-1 31,0-13-16,0 14 1,0-14-16,0 13 31,-40 27-15,27-39-16,-13-1 31,-1-13 0,14 13-31,-66 14 16,52-27 15,-12 0-15,25 0 0,-12 0-1,13 0 16,-1 0 16,14-14-31,0-25 15,14 25-15,-1 1-1,0 0-15,40-27 16,-13 27 15,-14 0-15,-13 0 31,1-1-16,12-12-15,-13 13-1,1-1 1,-1 1 0,-13 0-1,39-27-15,-25 14 31,-14 13-31,13-14 16,0-39 15,0 40-15,14 12 0,-1-39-1,-12 14 1,-14 25 15,0 1 125,-14 13-140,1 0 0,0 0 46,0 0-46,-1 13 15,-25 14 47,25 13-47,1-27-15,0 0 0,0 14-16,0-27 15,-1 13 16,1 0 16</inkml:trace>
-  <inkml:trace contextRef="#ctx0" brushRef="#br0" timeOffset="21728.93">20730 4419 0,'0'-53'0,"0"39"15,-13 1 1,-27 0 0,14-27-1,-1 40 1,14 0-1,-40 0 1,40 0 0,0 0-16,-27 0 15,27 0 1,0 0 0,-14 0 15,-13 40-16,40-27 1,0 0 0,0 1 15,0 39-15,0-40-1,0 13 1,0 14-1,0-27 1,0 0-16,14 1 16,-1 12-1,0-13 1,0-13 0,14 14-1,12-14 1,-25 0-1,-1 0 17,27 0-17,-14 0-15,1-27 16,-1-13 0,-26 27 77,0 0-46,0 0-31,0-1-1,26-12 79,-26 13-78,14-14-16,-14 1 31,0 52 157,0-12-188,13 25 15,-13-12 1,0-14-1,0 0-15,0 40 16,0-40 0,13 67-1,0-67 1,-13 13 15,14 14-15,-14 13-1,0-27 1,0 27 0,0-13 15,0-27-31,0 27 31,0-14-15,0-12-1</inkml:trace>
-  <inkml:trace contextRef="#ctx0" brushRef="#br0" timeOffset="25999.77">8506 5689 0,'-13'0'62,"13"13"-46,0 13-1,0-13-15,0 1 16,0 25 0,0 14-1,0-13 1,0 13 0,0-13-1,0-27 1</inkml:trace>
-  <inkml:trace contextRef="#ctx0" brushRef="#br0" timeOffset="27792.34">9869 5689 0,'0'13'63,"13"0"-48,-13 0-15,0 0 16,0 14 0,13 13-16,-13-27 15,53 27 1,-26 26-1,26-53 17,-40-13-17,0 13 1,14 0 0,26-13-1,-27 0 1,27 0-1,-27 0 1,1-26 0,-14-14-1,27-52 1,-40 39 0,0-13-1,0 26 1,0 0 15,0 14-15,0-1 15,0 1 47,-13 26-47,-40 0-15,39 0-16,-65 13 16,66 0 30,0-13-14,-14 0-17,1 13-15,12-13 16,-39 27 15,40-14 16,0 0-16,13 14 32,0-14-48,0 0 1,0 1 0,0 12-1,0-13-15,0 53 32,0-52-17,0 12 1</inkml:trace>
-  <inkml:trace contextRef="#ctx0" brushRef="#br0" timeOffset="28623.88">11271 5689 0,'0'0'0,"0"13"94,13 0-78,-13 0-16,0 27 15,0-27 1,0 0 0,14 14-1,-14-1 1,0-12 0,0-1-1</inkml:trace>
-  <inkml:trace contextRef="#ctx0" brushRef="#br0" timeOffset="30198.78">13110 5636 0,'-13'0'109,"13"26"-93,0-13-1,0 14-15,0 12 16,0 28-1,26-1 1,1-27 0,-1-12-1,-13-14 32,14-13-31,-14 0-1,14 0 1,-1 0 0,14 0-1,-27-13 1,0 0 15,-13-27-31,27 14 16,-1-41-1,-13 14 1,-13 27 0,0 0-1,0-1 17,0 14-17,0-14 1,0 1-1,0 13 1,0-14 0,-13 27-1,-27-13 1,14 13 0,0 0 30,12 0-46,-12 0 16,13 0 0,-1 0-1,1 0 48,0 0-48,-27 13-15,27 0 16,0 14 0,-14-1 46,14-12-46,13-1-1,-13 0 1,13 0-16,-13 27 31,-1-14-31,-12 14 32</inkml:trace>
-  <inkml:trace contextRef="#ctx0" brushRef="#br0" timeOffset="31016.04">14235 5622 0,'13'0'46,"-13"14"-14,0 12-17,0-13 1,0 1 0,0 25-1,0-12 1,0-14-1,0 27 1,0-27 0,0 0-1,0 0 1</inkml:trace>
-  <inkml:trace contextRef="#ctx0" brushRef="#br0" timeOffset="32984.19">15597 5675 0,'13'14'78,"-13"-1"-62,14 0-16,-1 0 15,0 14 64,27 12-79,-27-39 15,27 14 1,-14-14-1,-13 0 32,1 0-31,-1 0 0,53 0-1,-53-14 1,-13 1-1,13-27 1,-13 14 0,0-27-1,0 40 1,0 0 0,0-27-1,0 13 1,-39-12-1,26 12 1,-40-39 0,39 53-1,1 13 17,-27-13-17,14 13 1,-27 0-1,-26 0 1,52 0-16,-26 0 16,40 0-16,0 0 15,-27 26 1,27-13 0,0 27-1,13-27 48,0 1-32,0 25-15,0-26 15,0 1 0,0-1-15,13 0-1,13 14 1,-12-14 0,12 13-1,-13-12 1,1 12-1,-1-13 1,0 0 0,0 1-1,1-1 17,-1 27-17,0-27 1,40 13-1,-40-26 1,27 14 0,-27-14 171,0 0-187,27 0 16,0 0-1,-1 0 1</inkml:trace>
-  <inkml:trace contextRef="#ctx0" brushRef="#br0" timeOffset="33887.08">17410 5609 0,'13'0'16,"-13"13"31,0 1-31,0-1-1,0 53 1,0-13-1,0-27 1,0 14 0,0-13-1,0 12 1</inkml:trace>
-  <inkml:trace contextRef="#ctx0" brushRef="#br0" timeOffset="35279.54">18772 5503 0,'0'14'47,"0"-1"-31,0 13-1,0-13 1,0 1-16,0 52 16,0-40-1,0 40 1,0-26-1,0-27 1,0 1 0,0-1 15,13 0 0,27-13-15,-27 0-1,53 0 1,-26 0 0,26-13-1,-39-27 1,39-26 0,-13-27-1,-27 67 1,-12-14-1,-14 27 1,0 0 0,0-14-1,0 14 1,0 0 0,0-14 15,-40 1-16,-26 26 1,13 0 0,-53 0-1,27 0 1,12 0 0,54 0-16,0 0 15,-27 0 1,14 0-1,13 0 17,-1 13-17,14 14 32,-13-14-31,0 0-1</inkml:trace>
-  <inkml:trace contextRef="#ctx0" brushRef="#br0" timeOffset="38161.22">20743 5728 0,'0'13'62,"0"1"-62,0 39 16,0 26 0,0-53-1,0 27 1,0-39-16,0 52 16,40-40-1,-14 1 1,1-1 15,-1-26-15,14 0-1,-27 0 1,67-53 0,-27-13-1,0-27 16,-40 41-15,-13 38 0,0 1 15,0 0-15,0 0-1,0-1-15,0 1 31,0 0-15,0 0 0,-13 13-1,-1 0 17,1 0-17,-13 0 1,12 0-16,1 0 15,0 0 17,-14 0-17,1 0 1,-27 0 0,40 0-1,0 0 16,-1 0-15,-12 0 15,13 0-31,-1 0 16,1 13 0,0 13 15,13-12 0,0 25-15,0-12-1,-13-14 1,0 0 0,13 0 15,0 1-16</inkml:trace>
-  <inkml:trace contextRef="#ctx0" brushRef="#br0" timeOffset="39608.89">22000 5781 0,'13'0'78,"-13"13"-62,0 14-1,27-1-15,-14-12 16,-13 38-16,13 1 16,-13-13-1,0 0 16,0-27-15</inkml:trace>
-  <inkml:trace contextRef="#ctx0" brushRef="#br0" timeOffset="41698.18">6628 5861 0,'13'13'125,"0"0"-109,1-13 0,-1 0-1,53 0 1,-13-53-1,-27 40-15,14-40 16,-27 26 0,14 1-1,-27 0 1,0-14 0,0 13-1,-14-39 1,1 53-1,0-13 1,-14 12 0,1 1-1,-14 13 1,14 0 15,-40 0-15,26 0-1,0 0 17,1 13-17,12 1 1,14 25 0,13-26 15,0 1-16,0-1-15,0 13 16,0 1 0,0 13-1,0-1-15,0 1 16,0 0 15,13 13-15,0-40-1,-13 0 1,14 13 0,-1 1-1,0-14 32,14-13-47,39 27 16,0-27-1,-40 0 1,-12 0 0,12 0-1,-13 0 1,0 0 46,1-14-62,-1 1 16,0 0 0,0 0-1,1-1 79,-14-25-16</inkml:trace>
-  <inkml:trace contextRef="#ctx0" brushRef="#br0" timeOffset="44200.1">6800 6324 0,'-27'13'140,"14"0"-124,0 13 0,13-12-1,0 25 1,0-25-1,0-1 1,0 27 0,0-27-1,0 0 63,40-13-78,-27 0 16,0 0-16,27 0 16,-14 0-1,1 0-15,-14 0 16,0 0 0,0 0 109,27 0-110,-27 0 1,0 13-16,1 0 15,-14 14 1,0-14 0,0 0-1,0 27 1,0-27 15,-14 27 16,1-40-31,0 0 77,0 0-93,-14 0 0,14 13 16,0 0 0,0-13 15,-14 0-15,14 0-16,0 0 15,-1 0 16,-12-13-15,13 13 0,0 0-1,-1-26 63</inkml:trace>
-  <inkml:trace contextRef="#ctx0" brushRef="#br0" timeOffset="47027.91">20717 6760 0,'0'13'63,"0"1"-63,0-1 16,0 0-16,0 53 15,0 14 16,0-14-15,0-13 0,0-27-1,0-13 1,0 14 46,0-14-62,-13-26 110,13-27-95,-14 27-15,14-14 16,0-39 0,0 13-1,0-13 1,0 53 0,0-14-1,0 1 1,14-14-1,-1 1 1,0 25 47,0 1-32,1 13-31,-1 0 15,0-13 1,0 13 0,14 0 15,-14 0 0,0 0-15,0 0-1,27 0 1,-27 0-16,1 40 16,-14-27-1,13 13-15,-13 1 16,13 26 0,-13-40-1,0 40 16,0-27-15,0-12 0,0 12 15,0-13-15,0 0-1,0 1 1,0 12 187,0-13-187,0 14-1,0 13-15,0-27 16,0 26-1,40 28 1,-40-28 0,-14-52 187,-12-40-172,26 40-31</inkml:trace>
-  <inkml:trace contextRef="#ctx0" brushRef="#br0" timeOffset="47865.1">20677 6998 0,'-13'0'94,"26"0"-48,0 0-30,1 0-16,39 0 16,-27 0-1,-13 0 1,27 0 0,-14-13-1,1 13 16,-14-13-15</inkml:trace>
-  <inkml:trace contextRef="#ctx0" brushRef="#br0" timeOffset="48810.41">22291 6641 0,'0'13'47,"0"40"-31,0-40-1,0 54-15,-26 38 16,26-25 0,0 26-1,0-53 16,0-40-31,0 26 16,0-78 156</inkml:trace>
-  <inkml:trace contextRef="#ctx0" brushRef="#br0" timeOffset="50390.5">22251 6707 0,'14'0'16,"-1"0"15,13 0-15,-12 0-1,-1-13 1,0 13 46,14 0-30,-14 0-1,13 0-16,14 0 48,-14 0-47,-12 0 15,12 0-16,-13 0 17,-13 13-1,0 0 0,0 14-15,0-14-16,0 0 47,0 1-16,0 12 0,0-13 16,-13 0 31,-13-13-62,12 14-16,-12-1 15,-27 27 1,27-27 0,-14 0-1,27-13 1,-1 13 0,-12 1-16,13-1 15,-14 0 16</inkml:trace>
-</inkml:ink>
 </file>
 
 <file path=ppt/slideLayouts/slideLayout1.xml><?xml version="1.0" encoding="utf-8"?>
@@ -9477,7 +9429,7 @@
           <a:p>
             <a:fld id="{193A7D5E-D396-4762-A45A-E4DCF79C016E}" type="datetimeFigureOut">
               <a:rPr lang="en-US" smtClean="0"/>
-              <a:t>2/13/2021</a:t>
+              <a:t>2/14/2021</a:t>
             </a:fld>
             <a:endParaRPr lang="en-US"/>
           </a:p>
@@ -9675,7 +9627,7 @@
           <a:p>
             <a:fld id="{193A7D5E-D396-4762-A45A-E4DCF79C016E}" type="datetimeFigureOut">
               <a:rPr lang="en-US" smtClean="0"/>
-              <a:t>2/13/2021</a:t>
+              <a:t>2/14/2021</a:t>
             </a:fld>
             <a:endParaRPr lang="en-US"/>
           </a:p>
@@ -9950,7 +9902,7 @@
           <a:p>
             <a:fld id="{193A7D5E-D396-4762-A45A-E4DCF79C016E}" type="datetimeFigureOut">
               <a:rPr lang="en-US" smtClean="0"/>
-              <a:t>2/13/2021</a:t>
+              <a:t>2/14/2021</a:t>
             </a:fld>
             <a:endParaRPr lang="en-US"/>
           </a:p>
@@ -10342,7 +10294,7 @@
           <a:p>
             <a:fld id="{193A7D5E-D396-4762-A45A-E4DCF79C016E}" type="datetimeFigureOut">
               <a:rPr lang="en-US" smtClean="0"/>
-              <a:t>2/13/2021</a:t>
+              <a:t>2/14/2021</a:t>
             </a:fld>
             <a:endParaRPr lang="en-US"/>
           </a:p>
@@ -10754,7 +10706,7 @@
           <a:p>
             <a:fld id="{193A7D5E-D396-4762-A45A-E4DCF79C016E}" type="datetimeFigureOut">
               <a:rPr lang="en-US" smtClean="0"/>
-              <a:t>2/13/2021</a:t>
+              <a:t>2/14/2021</a:t>
             </a:fld>
             <a:endParaRPr lang="en-US"/>
           </a:p>
@@ -10895,7 +10847,7 @@
           <a:p>
             <a:fld id="{193A7D5E-D396-4762-A45A-E4DCF79C016E}" type="datetimeFigureOut">
               <a:rPr lang="en-US" smtClean="0"/>
-              <a:t>2/13/2021</a:t>
+              <a:t>2/14/2021</a:t>
             </a:fld>
             <a:endParaRPr lang="en-US"/>
           </a:p>
@@ -11008,7 +10960,7 @@
           <a:p>
             <a:fld id="{193A7D5E-D396-4762-A45A-E4DCF79C016E}" type="datetimeFigureOut">
               <a:rPr lang="en-US" smtClean="0"/>
-              <a:t>2/13/2021</a:t>
+              <a:t>2/14/2021</a:t>
             </a:fld>
             <a:endParaRPr lang="en-US"/>
           </a:p>
@@ -11319,7 +11271,7 @@
           <a:p>
             <a:fld id="{193A7D5E-D396-4762-A45A-E4DCF79C016E}" type="datetimeFigureOut">
               <a:rPr lang="en-US" smtClean="0"/>
-              <a:t>2/13/2021</a:t>
+              <a:t>2/14/2021</a:t>
             </a:fld>
             <a:endParaRPr lang="en-US"/>
           </a:p>
@@ -11607,7 +11559,7 @@
           <a:p>
             <a:fld id="{193A7D5E-D396-4762-A45A-E4DCF79C016E}" type="datetimeFigureOut">
               <a:rPr lang="en-US" smtClean="0"/>
-              <a:t>2/13/2021</a:t>
+              <a:t>2/14/2021</a:t>
             </a:fld>
             <a:endParaRPr lang="en-US"/>
           </a:p>
@@ -11805,7 +11757,7 @@
           <a:p>
             <a:fld id="{193A7D5E-D396-4762-A45A-E4DCF79C016E}" type="datetimeFigureOut">
               <a:rPr lang="en-US" smtClean="0"/>
-              <a:t>2/13/2021</a:t>
+              <a:t>2/14/2021</a:t>
             </a:fld>
             <a:endParaRPr lang="en-US"/>
           </a:p>
@@ -12013,7 +11965,7 @@
           <a:p>
             <a:fld id="{193A7D5E-D396-4762-A45A-E4DCF79C016E}" type="datetimeFigureOut">
               <a:rPr lang="en-US" smtClean="0"/>
-              <a:t>2/13/2021</a:t>
+              <a:t>2/14/2021</a:t>
             </a:fld>
             <a:endParaRPr lang="en-US"/>
           </a:p>
@@ -13865,7 +13817,7 @@
           <a:p>
             <a:fld id="{193A7D5E-D396-4762-A45A-E4DCF79C016E}" type="datetimeFigureOut">
               <a:rPr lang="en-US" smtClean="0"/>
-              <a:t>2/13/2021</a:t>
+              <a:t>2/14/2021</a:t>
             </a:fld>
             <a:endParaRPr lang="en-US"/>
           </a:p>
@@ -14398,8 +14350,8 @@
         </p:nvSpPr>
         <p:spPr>
           <a:xfrm>
-            <a:off x="3070487" y="1387021"/>
-            <a:ext cx="1186544" cy="2369457"/>
+            <a:off x="784225" y="892628"/>
+            <a:ext cx="1186544" cy="1785252"/>
           </a:xfrm>
           <a:prstGeom prst="rect">
             <a:avLst/>
@@ -14447,7 +14399,7 @@
         </p:nvCxnSpPr>
         <p:spPr>
           <a:xfrm>
-            <a:off x="3146687" y="1829707"/>
+            <a:off x="860425" y="1103993"/>
             <a:ext cx="914400" cy="638628"/>
           </a:xfrm>
           <a:prstGeom prst="bentConnector3">
@@ -14490,7 +14442,7 @@
         </p:nvCxnSpPr>
         <p:spPr>
           <a:xfrm flipV="1">
-            <a:off x="4772287" y="1829707"/>
+            <a:off x="2486025" y="1103993"/>
             <a:ext cx="914400" cy="638628"/>
           </a:xfrm>
           <a:prstGeom prst="bentConnector3">
@@ -14531,7 +14483,7 @@
         </p:nvSpPr>
         <p:spPr>
           <a:xfrm>
-            <a:off x="2286262" y="1873250"/>
+            <a:off x="0" y="1147536"/>
             <a:ext cx="689429" cy="307777"/>
           </a:xfrm>
           <a:prstGeom prst="rect">
@@ -14568,7 +14520,7 @@
         </p:nvSpPr>
         <p:spPr>
           <a:xfrm>
-            <a:off x="2286262" y="2773135"/>
+            <a:off x="0" y="2047421"/>
             <a:ext cx="689429" cy="307777"/>
           </a:xfrm>
           <a:prstGeom prst="rect">
@@ -14605,7 +14557,7 @@
         </p:nvCxnSpPr>
         <p:spPr>
           <a:xfrm>
-            <a:off x="3146687" y="3135992"/>
+            <a:off x="860425" y="2410278"/>
             <a:ext cx="827314" cy="0"/>
           </a:xfrm>
           <a:prstGeom prst="line">
@@ -14646,7 +14598,7 @@
         </p:nvCxnSpPr>
         <p:spPr>
           <a:xfrm>
-            <a:off x="4859373" y="3135992"/>
+            <a:off x="2573111" y="2410278"/>
             <a:ext cx="827314" cy="0"/>
           </a:xfrm>
           <a:prstGeom prst="line">
@@ -14687,7 +14639,7 @@
         </p:nvSpPr>
         <p:spPr>
           <a:xfrm>
-            <a:off x="3128545" y="2766660"/>
+            <a:off x="842283" y="2040946"/>
             <a:ext cx="631371" cy="253916"/>
           </a:xfrm>
           <a:prstGeom prst="rect">
@@ -14724,7 +14676,7 @@
         </p:nvSpPr>
         <p:spPr>
           <a:xfrm>
-            <a:off x="4917429" y="2766660"/>
+            <a:off x="2631167" y="2040946"/>
             <a:ext cx="631371" cy="253916"/>
           </a:xfrm>
           <a:prstGeom prst="rect">
@@ -14761,8 +14713,8 @@
         </p:nvSpPr>
         <p:spPr>
           <a:xfrm>
-            <a:off x="4727837" y="1387021"/>
-            <a:ext cx="1186544" cy="2369457"/>
+            <a:off x="2441575" y="892628"/>
+            <a:ext cx="1186544" cy="1785252"/>
           </a:xfrm>
           <a:prstGeom prst="rect">
             <a:avLst/>
@@ -14810,7 +14762,7 @@
         </p:nvSpPr>
         <p:spPr>
           <a:xfrm>
-            <a:off x="3070487" y="4199164"/>
+            <a:off x="744763" y="3115723"/>
             <a:ext cx="1136644" cy="560614"/>
           </a:xfrm>
           <a:prstGeom prst="rect">
@@ -14881,7 +14833,7 @@
         </p:nvCxnSpPr>
         <p:spPr>
           <a:xfrm>
-            <a:off x="3673736" y="3757989"/>
+            <a:off x="1348012" y="2674548"/>
             <a:ext cx="0" cy="434528"/>
           </a:xfrm>
           <a:prstGeom prst="straightConnector1">
@@ -14923,7 +14875,7 @@
         </p:nvSpPr>
         <p:spPr>
           <a:xfrm>
-            <a:off x="4777737" y="4211864"/>
+            <a:off x="2452013" y="3128423"/>
             <a:ext cx="1136644" cy="560614"/>
           </a:xfrm>
           <a:prstGeom prst="rect">
@@ -14994,7 +14946,7 @@
         </p:nvCxnSpPr>
         <p:spPr>
           <a:xfrm>
-            <a:off x="5321109" y="3764636"/>
+            <a:off x="2995385" y="2681195"/>
             <a:ext cx="0" cy="434528"/>
           </a:xfrm>
           <a:prstGeom prst="straightConnector1">
@@ -15040,18 +14992,218 @@
         </p:nvSpPr>
         <p:spPr>
           <a:xfrm>
-            <a:off x="543983" y="117106"/>
-            <a:ext cx="7886700" cy="994172"/>
+            <a:off x="117737" y="104015"/>
+            <a:ext cx="7886700" cy="534013"/>
           </a:xfrm>
         </p:spPr>
         <p:txBody>
-          <a:bodyPr/>
+          <a:bodyPr>
+            <a:normAutofit fontScale="90000"/>
+          </a:bodyPr>
           <a:lstStyle/>
           <a:p>
             <a:r>
               <a:rPr lang="en-US" dirty="0"/>
-              <a:t>Start-Stop Indication</a:t>
-            </a:r>
+              <a:t>Overview of I2C</a:t>
+            </a:r>
+          </a:p>
+        </p:txBody>
+      </p:sp>
+      <p:sp>
+        <p:nvSpPr>
+          <p:cNvPr id="17" name="Rectangle 16">
+            <a:extLst>
+              <a:ext uri="{FF2B5EF4-FFF2-40B4-BE49-F238E27FC236}">
+                <a16:creationId xmlns:a16="http://schemas.microsoft.com/office/drawing/2014/main" id="{0B9FA5BA-12B9-452D-9B00-A54BF8E642EF}"/>
+              </a:ext>
+            </a:extLst>
+          </p:cNvPr>
+          <p:cNvSpPr/>
+          <p:nvPr/>
+        </p:nvSpPr>
+        <p:spPr>
+          <a:xfrm>
+            <a:off x="3810001" y="858419"/>
+            <a:ext cx="5065473" cy="2458095"/>
+          </a:xfrm>
+          <a:prstGeom prst="rect">
+            <a:avLst/>
+          </a:prstGeom>
+        </p:spPr>
+        <p:style>
+          <a:lnRef idx="2">
+            <a:schemeClr val="accent6"/>
+          </a:lnRef>
+          <a:fillRef idx="1">
+            <a:schemeClr val="lt1"/>
+          </a:fillRef>
+          <a:effectRef idx="0">
+            <a:schemeClr val="accent6"/>
+          </a:effectRef>
+          <a:fontRef idx="minor">
+            <a:schemeClr val="dk1"/>
+          </a:fontRef>
+        </p:style>
+        <p:txBody>
+          <a:bodyPr rtlCol="0" anchor="ctr"/>
+          <a:lstStyle/>
+          <a:p>
+            <a:pPr marL="285750" indent="-285750">
+              <a:buFont typeface="Arial" panose="020B0604020202020204" pitchFamily="34" charset="0"/>
+              <a:buChar char="•"/>
+            </a:pPr>
+            <a:r>
+              <a:rPr lang="en-US" sz="1000" b="1" u="sng" dirty="0"/>
+              <a:t>Note</a:t>
+            </a:r>
+          </a:p>
+          <a:p>
+            <a:pPr marL="285750" indent="-285750">
+              <a:buFont typeface="Arial" panose="020B0604020202020204" pitchFamily="34" charset="0"/>
+              <a:buChar char="•"/>
+            </a:pPr>
+            <a:r>
+              <a:rPr lang="en-US" sz="1000" b="1" dirty="0"/>
+              <a:t>Data Handling</a:t>
+            </a:r>
+          </a:p>
+          <a:p>
+            <a:pPr marL="742950" lvl="1" indent="-285750">
+              <a:buFont typeface="Arial" panose="020B0604020202020204" pitchFamily="34" charset="0"/>
+              <a:buChar char="•"/>
+            </a:pPr>
+            <a:r>
+              <a:rPr lang="en-US" sz="1000" b="1" dirty="0"/>
+              <a:t>SDA should change during </a:t>
+            </a:r>
+            <a:r>
+              <a:rPr lang="en-US" sz="1000" b="1" dirty="0" err="1"/>
+              <a:t>negedge</a:t>
+            </a:r>
+            <a:r>
+              <a:rPr lang="en-US" sz="1000" b="1" dirty="0"/>
+              <a:t> of SCL and remain constant during </a:t>
+            </a:r>
+            <a:r>
+              <a:rPr lang="en-US" sz="1000" b="1" dirty="0" err="1"/>
+              <a:t>Posedge</a:t>
+            </a:r>
+            <a:r>
+              <a:rPr lang="en-US" sz="1000" b="1" dirty="0"/>
+              <a:t> of SCL</a:t>
+            </a:r>
+          </a:p>
+          <a:p>
+            <a:pPr marL="742950" lvl="1" indent="-285750">
+              <a:buFont typeface="Arial" panose="020B0604020202020204" pitchFamily="34" charset="0"/>
+              <a:buChar char="•"/>
+            </a:pPr>
+            <a:r>
+              <a:rPr lang="en-US" sz="1000" b="1" dirty="0"/>
+              <a:t>When SCL = 1, Start Stop transition should occur on SDA</a:t>
+            </a:r>
+          </a:p>
+          <a:p>
+            <a:pPr marL="1200150" lvl="2" indent="-285750">
+              <a:buFont typeface="Arial" panose="020B0604020202020204" pitchFamily="34" charset="0"/>
+              <a:buChar char="•"/>
+            </a:pPr>
+            <a:r>
+              <a:rPr lang="en-US" sz="1000" b="1" dirty="0"/>
+              <a:t>SDA = 1 to 0 </a:t>
+            </a:r>
+            <a:r>
+              <a:rPr lang="en-US" sz="1000" b="1" dirty="0">
+                <a:sym typeface="Wingdings" panose="05000000000000000000" pitchFamily="2" charset="2"/>
+              </a:rPr>
+              <a:t> Start</a:t>
+            </a:r>
+          </a:p>
+          <a:p>
+            <a:pPr marL="1200150" lvl="2" indent="-285750">
+              <a:buFont typeface="Arial" panose="020B0604020202020204" pitchFamily="34" charset="0"/>
+              <a:buChar char="•"/>
+            </a:pPr>
+            <a:r>
+              <a:rPr lang="en-US" sz="1000" b="1" dirty="0">
+                <a:sym typeface="Wingdings" panose="05000000000000000000" pitchFamily="2" charset="2"/>
+              </a:rPr>
+              <a:t>SDA = 0 to 1  Stop</a:t>
+            </a:r>
+            <a:endParaRPr lang="en-US" sz="1000" b="1" dirty="0"/>
+          </a:p>
+          <a:p>
+            <a:pPr marL="285750" indent="-285750">
+              <a:buFont typeface="Arial" panose="020B0604020202020204" pitchFamily="34" charset="0"/>
+              <a:buChar char="•"/>
+            </a:pPr>
+            <a:r>
+              <a:rPr lang="en-US" sz="1000" b="1" dirty="0"/>
+              <a:t>Ninth clock pulse from master = acknowledgement</a:t>
+            </a:r>
+          </a:p>
+          <a:p>
+            <a:pPr marL="285750" indent="-285750">
+              <a:buFont typeface="Arial" panose="020B0604020202020204" pitchFamily="34" charset="0"/>
+              <a:buChar char="•"/>
+            </a:pPr>
+            <a:r>
+              <a:rPr lang="en-US" sz="1000" b="1" dirty="0"/>
+              <a:t>ACK signal working</a:t>
+            </a:r>
+          </a:p>
+          <a:p>
+            <a:pPr marL="742950" lvl="1" indent="-285750">
+              <a:buFont typeface="Arial" panose="020B0604020202020204" pitchFamily="34" charset="0"/>
+              <a:buChar char="•"/>
+            </a:pPr>
+            <a:r>
+              <a:rPr lang="en-US" sz="1000" b="1" dirty="0"/>
+              <a:t>Tx releases SDA Line during ACK Clock </a:t>
+            </a:r>
+            <a:r>
+              <a:rPr lang="en-US" sz="1000" b="1" dirty="0">
+                <a:sym typeface="Wingdings" panose="05000000000000000000" pitchFamily="2" charset="2"/>
+              </a:rPr>
+              <a:t> 9</a:t>
+            </a:r>
+            <a:r>
+              <a:rPr lang="en-US" sz="1000" b="1" baseline="30000" dirty="0">
+                <a:sym typeface="Wingdings" panose="05000000000000000000" pitchFamily="2" charset="2"/>
+              </a:rPr>
+              <a:t>th</a:t>
+            </a:r>
+            <a:r>
+              <a:rPr lang="en-US" sz="1000" b="1" dirty="0">
+                <a:sym typeface="Wingdings" panose="05000000000000000000" pitchFamily="2" charset="2"/>
+              </a:rPr>
+              <a:t> clock</a:t>
+            </a:r>
+          </a:p>
+          <a:p>
+            <a:pPr marL="742950" lvl="1" indent="-285750">
+              <a:buFont typeface="Arial" panose="020B0604020202020204" pitchFamily="34" charset="0"/>
+              <a:buChar char="•"/>
+            </a:pPr>
+            <a:r>
+              <a:rPr lang="en-US" sz="1000" b="1" dirty="0">
+                <a:sym typeface="Wingdings" panose="05000000000000000000" pitchFamily="2" charset="2"/>
+              </a:rPr>
+              <a:t>Rx can pull SDA Line to Low and remains Low during the HIGH period of this clock</a:t>
+            </a:r>
+          </a:p>
+          <a:p>
+            <a:pPr marL="742950" lvl="1" indent="-285750">
+              <a:buFont typeface="Arial" panose="020B0604020202020204" pitchFamily="34" charset="0"/>
+              <a:buChar char="•"/>
+            </a:pPr>
+            <a:r>
+              <a:rPr lang="en-US" sz="1000" b="1" dirty="0">
+                <a:sym typeface="Wingdings" panose="05000000000000000000" pitchFamily="2" charset="2"/>
+              </a:rPr>
+              <a:t>When this High is detected it is called as NACK</a:t>
+            </a:r>
+            <a:endParaRPr lang="en-US" sz="1000" b="1" dirty="0"/>
           </a:p>
         </p:txBody>
       </p:sp>
@@ -15069,6 +15221,645 @@
 </file>
 
 <file path=ppt/slides/slide3.xml><?xml version="1.0" encoding="utf-8"?>
+<p:sld xmlns:a="http://schemas.openxmlformats.org/drawingml/2006/main" xmlns:r="http://schemas.openxmlformats.org/officeDocument/2006/relationships" xmlns:p="http://schemas.openxmlformats.org/presentationml/2006/main">
+  <p:cSld>
+    <p:spTree>
+      <p:nvGrpSpPr>
+        <p:cNvPr id="1" name=""/>
+        <p:cNvGrpSpPr/>
+        <p:nvPr/>
+      </p:nvGrpSpPr>
+      <p:grpSpPr>
+        <a:xfrm>
+          <a:off x="0" y="0"/>
+          <a:ext cx="0" cy="0"/>
+          <a:chOff x="0" y="0"/>
+          <a:chExt cx="0" cy="0"/>
+        </a:xfrm>
+      </p:grpSpPr>
+      <p:sp>
+        <p:nvSpPr>
+          <p:cNvPr id="2" name="Title 1">
+            <a:extLst>
+              <a:ext uri="{FF2B5EF4-FFF2-40B4-BE49-F238E27FC236}">
+                <a16:creationId xmlns:a16="http://schemas.microsoft.com/office/drawing/2014/main" id="{D4EB3EFE-4104-48E3-90EC-84D5ACCD27D5}"/>
+              </a:ext>
+            </a:extLst>
+          </p:cNvPr>
+          <p:cNvSpPr>
+            <a:spLocks noGrp="1"/>
+          </p:cNvSpPr>
+          <p:nvPr>
+            <p:ph type="title"/>
+          </p:nvPr>
+        </p:nvSpPr>
+        <p:spPr>
+          <a:xfrm>
+            <a:off x="154858" y="116114"/>
+            <a:ext cx="6555921" cy="408327"/>
+          </a:xfrm>
+        </p:spPr>
+        <p:txBody>
+          <a:bodyPr>
+            <a:noAutofit/>
+          </a:bodyPr>
+          <a:lstStyle/>
+          <a:p>
+            <a:r>
+              <a:rPr lang="en-US" sz="2000" dirty="0"/>
+              <a:t>Sample Waveforms from Datasheet</a:t>
+            </a:r>
+          </a:p>
+        </p:txBody>
+      </p:sp>
+      <p:pic>
+        <p:nvPicPr>
+          <p:cNvPr id="3" name="Picture 2" descr="Diagram&#10;&#10;Description automatically generated">
+            <a:extLst>
+              <a:ext uri="{FF2B5EF4-FFF2-40B4-BE49-F238E27FC236}">
+                <a16:creationId xmlns:a16="http://schemas.microsoft.com/office/drawing/2014/main" id="{54C1E2B2-BEFD-418F-BA4F-A5F0F234F410}"/>
+              </a:ext>
+            </a:extLst>
+          </p:cNvPr>
+          <p:cNvPicPr>
+            <a:picLocks noChangeAspect="1"/>
+          </p:cNvPicPr>
+          <p:nvPr/>
+        </p:nvPicPr>
+        <p:blipFill>
+          <a:blip r:embed="rId2"/>
+          <a:stretch>
+            <a:fillRect/>
+          </a:stretch>
+        </p:blipFill>
+        <p:spPr>
+          <a:xfrm>
+            <a:off x="0" y="524441"/>
+            <a:ext cx="5617029" cy="1797449"/>
+          </a:xfrm>
+          <a:prstGeom prst="rect">
+            <a:avLst/>
+          </a:prstGeom>
+        </p:spPr>
+      </p:pic>
+      <p:pic>
+        <p:nvPicPr>
+          <p:cNvPr id="4" name="Picture 3">
+            <a:extLst>
+              <a:ext uri="{FF2B5EF4-FFF2-40B4-BE49-F238E27FC236}">
+                <a16:creationId xmlns:a16="http://schemas.microsoft.com/office/drawing/2014/main" id="{CF0E338F-F1D5-4145-8EBF-9A70773248D0}"/>
+              </a:ext>
+            </a:extLst>
+          </p:cNvPr>
+          <p:cNvPicPr>
+            <a:picLocks noChangeAspect="1"/>
+          </p:cNvPicPr>
+          <p:nvPr/>
+        </p:nvPicPr>
+        <p:blipFill>
+          <a:blip r:embed="rId3"/>
+          <a:stretch>
+            <a:fillRect/>
+          </a:stretch>
+        </p:blipFill>
+        <p:spPr>
+          <a:xfrm>
+            <a:off x="5765363" y="1248213"/>
+            <a:ext cx="3226971" cy="1102216"/>
+          </a:xfrm>
+          <a:prstGeom prst="rect">
+            <a:avLst/>
+          </a:prstGeom>
+        </p:spPr>
+      </p:pic>
+      <p:pic>
+        <p:nvPicPr>
+          <p:cNvPr id="5" name="Picture 4">
+            <a:extLst>
+              <a:ext uri="{FF2B5EF4-FFF2-40B4-BE49-F238E27FC236}">
+                <a16:creationId xmlns:a16="http://schemas.microsoft.com/office/drawing/2014/main" id="{D5A6E67C-97AA-4600-921C-C5CB1217E8A2}"/>
+              </a:ext>
+            </a:extLst>
+          </p:cNvPr>
+          <p:cNvPicPr>
+            <a:picLocks noChangeAspect="1"/>
+          </p:cNvPicPr>
+          <p:nvPr/>
+        </p:nvPicPr>
+        <p:blipFill>
+          <a:blip r:embed="rId4"/>
+          <a:stretch>
+            <a:fillRect/>
+          </a:stretch>
+        </p:blipFill>
+        <p:spPr>
+          <a:xfrm>
+            <a:off x="5662157" y="0"/>
+            <a:ext cx="3326985" cy="1132099"/>
+          </a:xfrm>
+          <a:prstGeom prst="rect">
+            <a:avLst/>
+          </a:prstGeom>
+        </p:spPr>
+      </p:pic>
+      <p:pic>
+        <p:nvPicPr>
+          <p:cNvPr id="6" name="Picture 5" descr="Diagram&#10;&#10;Description automatically generated with medium confidence">
+            <a:extLst>
+              <a:ext uri="{FF2B5EF4-FFF2-40B4-BE49-F238E27FC236}">
+                <a16:creationId xmlns:a16="http://schemas.microsoft.com/office/drawing/2014/main" id="{79EFC370-94F6-452E-AAF1-A44A5727F459}"/>
+              </a:ext>
+            </a:extLst>
+          </p:cNvPr>
+          <p:cNvPicPr>
+            <a:picLocks noChangeAspect="1"/>
+          </p:cNvPicPr>
+          <p:nvPr/>
+        </p:nvPicPr>
+        <p:blipFill>
+          <a:blip r:embed="rId5"/>
+          <a:stretch>
+            <a:fillRect/>
+          </a:stretch>
+        </p:blipFill>
+        <p:spPr>
+          <a:xfrm>
+            <a:off x="326571" y="2787291"/>
+            <a:ext cx="4696843" cy="1831768"/>
+          </a:xfrm>
+          <a:prstGeom prst="rect">
+            <a:avLst/>
+          </a:prstGeom>
+          <a:ln>
+            <a:solidFill>
+              <a:schemeClr val="tx1"/>
+            </a:solidFill>
+          </a:ln>
+        </p:spPr>
+      </p:pic>
+      <p:pic>
+        <p:nvPicPr>
+          <p:cNvPr id="7" name="Picture 6" descr="Box and whisker chart&#10;&#10;Description automatically generated with medium confidence">
+            <a:extLst>
+              <a:ext uri="{FF2B5EF4-FFF2-40B4-BE49-F238E27FC236}">
+                <a16:creationId xmlns:a16="http://schemas.microsoft.com/office/drawing/2014/main" id="{7F6D8E88-DE7A-4FE9-8F6D-C3BA4DF0437A}"/>
+              </a:ext>
+            </a:extLst>
+          </p:cNvPr>
+          <p:cNvPicPr>
+            <a:picLocks noChangeAspect="1"/>
+          </p:cNvPicPr>
+          <p:nvPr/>
+        </p:nvPicPr>
+        <p:blipFill>
+          <a:blip r:embed="rId6"/>
+          <a:stretch>
+            <a:fillRect/>
+          </a:stretch>
+        </p:blipFill>
+        <p:spPr>
+          <a:xfrm>
+            <a:off x="5210059" y="2727716"/>
+            <a:ext cx="3585485" cy="1891343"/>
+          </a:xfrm>
+          <a:prstGeom prst="rect">
+            <a:avLst/>
+          </a:prstGeom>
+          <a:ln>
+            <a:solidFill>
+              <a:schemeClr val="tx1"/>
+            </a:solidFill>
+          </a:ln>
+        </p:spPr>
+      </p:pic>
+    </p:spTree>
+    <p:extLst>
+      <p:ext uri="{BB962C8B-B14F-4D97-AF65-F5344CB8AC3E}">
+        <p14:creationId xmlns:p14="http://schemas.microsoft.com/office/powerpoint/2010/main" val="193190838"/>
+      </p:ext>
+    </p:extLst>
+  </p:cSld>
+  <p:clrMapOvr>
+    <a:masterClrMapping/>
+  </p:clrMapOvr>
+</p:sld>
+</file>
+
+<file path=ppt/slides/slide4.xml><?xml version="1.0" encoding="utf-8"?>
+<p:sld xmlns:a="http://schemas.openxmlformats.org/drawingml/2006/main" xmlns:r="http://schemas.openxmlformats.org/officeDocument/2006/relationships" xmlns:p="http://schemas.openxmlformats.org/presentationml/2006/main">
+  <p:cSld>
+    <p:spTree>
+      <p:nvGrpSpPr>
+        <p:cNvPr id="1" name=""/>
+        <p:cNvGrpSpPr/>
+        <p:nvPr/>
+      </p:nvGrpSpPr>
+      <p:grpSpPr>
+        <a:xfrm>
+          <a:off x="0" y="0"/>
+          <a:ext cx="0" cy="0"/>
+          <a:chOff x="0" y="0"/>
+          <a:chExt cx="0" cy="0"/>
+        </a:xfrm>
+      </p:grpSpPr>
+      <p:sp>
+        <p:nvSpPr>
+          <p:cNvPr id="2" name="Title 1">
+            <a:extLst>
+              <a:ext uri="{FF2B5EF4-FFF2-40B4-BE49-F238E27FC236}">
+                <a16:creationId xmlns:a16="http://schemas.microsoft.com/office/drawing/2014/main" id="{6352DD0E-4492-489B-9D83-264B25D6ECF3}"/>
+              </a:ext>
+            </a:extLst>
+          </p:cNvPr>
+          <p:cNvSpPr>
+            <a:spLocks noGrp="1"/>
+          </p:cNvSpPr>
+          <p:nvPr>
+            <p:ph type="title"/>
+          </p:nvPr>
+        </p:nvSpPr>
+        <p:spPr/>
+        <p:txBody>
+          <a:bodyPr/>
+          <a:lstStyle/>
+          <a:p>
+            <a:r>
+              <a:rPr lang="en-US" dirty="0"/>
+              <a:t>Final Waveform Result</a:t>
+            </a:r>
+          </a:p>
+        </p:txBody>
+      </p:sp>
+    </p:spTree>
+    <p:extLst>
+      <p:ext uri="{BB962C8B-B14F-4D97-AF65-F5344CB8AC3E}">
+        <p14:creationId xmlns:p14="http://schemas.microsoft.com/office/powerpoint/2010/main" val="3808005051"/>
+      </p:ext>
+    </p:extLst>
+  </p:cSld>
+  <p:clrMapOvr>
+    <a:masterClrMapping/>
+  </p:clrMapOvr>
+</p:sld>
+</file>
+
+<file path=ppt/slides/slide5.xml><?xml version="1.0" encoding="utf-8"?>
+<p:sld xmlns:a="http://schemas.openxmlformats.org/drawingml/2006/main" xmlns:r="http://schemas.openxmlformats.org/officeDocument/2006/relationships" xmlns:p="http://schemas.openxmlformats.org/presentationml/2006/main">
+  <p:cSld>
+    <p:spTree>
+      <p:nvGrpSpPr>
+        <p:cNvPr id="1" name=""/>
+        <p:cNvGrpSpPr/>
+        <p:nvPr/>
+      </p:nvGrpSpPr>
+      <p:grpSpPr>
+        <a:xfrm>
+          <a:off x="0" y="0"/>
+          <a:ext cx="0" cy="0"/>
+          <a:chOff x="0" y="0"/>
+          <a:chExt cx="0" cy="0"/>
+        </a:xfrm>
+      </p:grpSpPr>
+      <p:pic>
+        <p:nvPicPr>
+          <p:cNvPr id="3" name="Picture 2">
+            <a:extLst>
+              <a:ext uri="{FF2B5EF4-FFF2-40B4-BE49-F238E27FC236}">
+                <a16:creationId xmlns:a16="http://schemas.microsoft.com/office/drawing/2014/main" id="{2A28AC40-E77D-4FCA-9948-973EEB83CD54}"/>
+              </a:ext>
+            </a:extLst>
+          </p:cNvPr>
+          <p:cNvPicPr>
+            <a:picLocks noChangeAspect="1"/>
+          </p:cNvPicPr>
+          <p:nvPr/>
+        </p:nvPicPr>
+        <p:blipFill>
+          <a:blip r:embed="rId2"/>
+          <a:stretch>
+            <a:fillRect/>
+          </a:stretch>
+        </p:blipFill>
+        <p:spPr>
+          <a:xfrm>
+            <a:off x="0" y="647429"/>
+            <a:ext cx="9144000" cy="2113497"/>
+          </a:xfrm>
+          <a:prstGeom prst="rect">
+            <a:avLst/>
+          </a:prstGeom>
+        </p:spPr>
+      </p:pic>
+      <p:pic>
+        <p:nvPicPr>
+          <p:cNvPr id="5" name="Picture 4">
+            <a:extLst>
+              <a:ext uri="{FF2B5EF4-FFF2-40B4-BE49-F238E27FC236}">
+                <a16:creationId xmlns:a16="http://schemas.microsoft.com/office/drawing/2014/main" id="{05589155-653F-49D0-9EAC-2A84A9D1808F}"/>
+              </a:ext>
+            </a:extLst>
+          </p:cNvPr>
+          <p:cNvPicPr>
+            <a:picLocks noChangeAspect="1"/>
+          </p:cNvPicPr>
+          <p:nvPr/>
+        </p:nvPicPr>
+        <p:blipFill>
+          <a:blip r:embed="rId3"/>
+          <a:stretch>
+            <a:fillRect/>
+          </a:stretch>
+        </p:blipFill>
+        <p:spPr>
+          <a:xfrm>
+            <a:off x="0" y="2826804"/>
+            <a:ext cx="9144000" cy="2113497"/>
+          </a:xfrm>
+          <a:prstGeom prst="rect">
+            <a:avLst/>
+          </a:prstGeom>
+        </p:spPr>
+      </p:pic>
+      <p:sp>
+        <p:nvSpPr>
+          <p:cNvPr id="6" name="Title 1">
+            <a:extLst>
+              <a:ext uri="{FF2B5EF4-FFF2-40B4-BE49-F238E27FC236}">
+                <a16:creationId xmlns:a16="http://schemas.microsoft.com/office/drawing/2014/main" id="{3A0FF8D9-C68B-45DD-9DBA-F20562F3231A}"/>
+              </a:ext>
+            </a:extLst>
+          </p:cNvPr>
+          <p:cNvSpPr txBox="1">
+            <a:spLocks/>
+          </p:cNvSpPr>
+          <p:nvPr/>
+        </p:nvSpPr>
+        <p:spPr>
+          <a:xfrm>
+            <a:off x="76201" y="0"/>
+            <a:ext cx="3807882" cy="581551"/>
+          </a:xfrm>
+          <a:prstGeom prst="rect">
+            <a:avLst/>
+          </a:prstGeom>
+        </p:spPr>
+        <p:txBody>
+          <a:bodyPr>
+            <a:normAutofit fontScale="97500"/>
+          </a:bodyPr>
+          <a:lstStyle>
+            <a:lvl1pPr algn="l" defTabSz="685800" rtl="0" eaLnBrk="1" latinLnBrk="0" hangingPunct="1">
+              <a:lnSpc>
+                <a:spcPct val="90000"/>
+              </a:lnSpc>
+              <a:spcBef>
+                <a:spcPct val="0"/>
+              </a:spcBef>
+              <a:buNone/>
+              <a:defRPr sz="3300" kern="1200">
+                <a:solidFill>
+                  <a:schemeClr val="tx1"/>
+                </a:solidFill>
+                <a:latin typeface="+mj-lt"/>
+                <a:ea typeface="+mj-ea"/>
+                <a:cs typeface="+mj-cs"/>
+              </a:defRPr>
+            </a:lvl1pPr>
+          </a:lstStyle>
+          <a:p>
+            <a:pPr fontAlgn="auto">
+              <a:spcAft>
+                <a:spcPts val="0"/>
+              </a:spcAft>
+            </a:pPr>
+            <a:r>
+              <a:rPr lang="en-US" dirty="0"/>
+              <a:t>I2C Slave - aah</a:t>
+            </a:r>
+          </a:p>
+        </p:txBody>
+      </p:sp>
+    </p:spTree>
+    <p:extLst>
+      <p:ext uri="{BB962C8B-B14F-4D97-AF65-F5344CB8AC3E}">
+        <p14:creationId xmlns:p14="http://schemas.microsoft.com/office/powerpoint/2010/main" val="3336021874"/>
+      </p:ext>
+    </p:extLst>
+  </p:cSld>
+  <p:clrMapOvr>
+    <a:masterClrMapping/>
+  </p:clrMapOvr>
+</p:sld>
+</file>
+
+<file path=ppt/slides/slide6.xml><?xml version="1.0" encoding="utf-8"?>
+<p:sld xmlns:a="http://schemas.openxmlformats.org/drawingml/2006/main" xmlns:r="http://schemas.openxmlformats.org/officeDocument/2006/relationships" xmlns:p="http://schemas.openxmlformats.org/presentationml/2006/main">
+  <p:cSld>
+    <p:spTree>
+      <p:nvGrpSpPr>
+        <p:cNvPr id="1" name=""/>
+        <p:cNvGrpSpPr/>
+        <p:nvPr/>
+      </p:nvGrpSpPr>
+      <p:grpSpPr>
+        <a:xfrm>
+          <a:off x="0" y="0"/>
+          <a:ext cx="0" cy="0"/>
+          <a:chOff x="0" y="0"/>
+          <a:chExt cx="0" cy="0"/>
+        </a:xfrm>
+      </p:grpSpPr>
+      <p:pic>
+        <p:nvPicPr>
+          <p:cNvPr id="3" name="Picture 2">
+            <a:extLst>
+              <a:ext uri="{FF2B5EF4-FFF2-40B4-BE49-F238E27FC236}">
+                <a16:creationId xmlns:a16="http://schemas.microsoft.com/office/drawing/2014/main" id="{5A16C2EF-5CAD-4A33-BD23-5A12BD922752}"/>
+              </a:ext>
+            </a:extLst>
+          </p:cNvPr>
+          <p:cNvPicPr>
+            <a:picLocks noChangeAspect="1"/>
+          </p:cNvPicPr>
+          <p:nvPr/>
+        </p:nvPicPr>
+        <p:blipFill>
+          <a:blip r:embed="rId2"/>
+          <a:stretch>
+            <a:fillRect/>
+          </a:stretch>
+        </p:blipFill>
+        <p:spPr>
+          <a:xfrm>
+            <a:off x="0" y="715598"/>
+            <a:ext cx="9144000" cy="1960869"/>
+          </a:xfrm>
+          <a:prstGeom prst="rect">
+            <a:avLst/>
+          </a:prstGeom>
+        </p:spPr>
+      </p:pic>
+      <p:pic>
+        <p:nvPicPr>
+          <p:cNvPr id="5" name="Picture 4">
+            <a:extLst>
+              <a:ext uri="{FF2B5EF4-FFF2-40B4-BE49-F238E27FC236}">
+                <a16:creationId xmlns:a16="http://schemas.microsoft.com/office/drawing/2014/main" id="{9DF57B4E-6F51-447D-AB14-49F83B451276}"/>
+              </a:ext>
+            </a:extLst>
+          </p:cNvPr>
+          <p:cNvPicPr>
+            <a:picLocks noChangeAspect="1"/>
+          </p:cNvPicPr>
+          <p:nvPr/>
+        </p:nvPicPr>
+        <p:blipFill>
+          <a:blip r:embed="rId3"/>
+          <a:stretch>
+            <a:fillRect/>
+          </a:stretch>
+        </p:blipFill>
+        <p:spPr>
+          <a:xfrm>
+            <a:off x="-8467" y="2810515"/>
+            <a:ext cx="9144000" cy="1960869"/>
+          </a:xfrm>
+          <a:prstGeom prst="rect">
+            <a:avLst/>
+          </a:prstGeom>
+        </p:spPr>
+      </p:pic>
+      <p:sp>
+        <p:nvSpPr>
+          <p:cNvPr id="6" name="Title 1">
+            <a:extLst>
+              <a:ext uri="{FF2B5EF4-FFF2-40B4-BE49-F238E27FC236}">
+                <a16:creationId xmlns:a16="http://schemas.microsoft.com/office/drawing/2014/main" id="{1E5561BF-8218-4FDF-9429-54A7B0B4277C}"/>
+              </a:ext>
+            </a:extLst>
+          </p:cNvPr>
+          <p:cNvSpPr txBox="1">
+            <a:spLocks/>
+          </p:cNvSpPr>
+          <p:nvPr/>
+        </p:nvSpPr>
+        <p:spPr>
+          <a:xfrm>
+            <a:off x="76201" y="0"/>
+            <a:ext cx="3807882" cy="581551"/>
+          </a:xfrm>
+          <a:prstGeom prst="rect">
+            <a:avLst/>
+          </a:prstGeom>
+        </p:spPr>
+        <p:txBody>
+          <a:bodyPr>
+            <a:normAutofit fontScale="97500"/>
+          </a:bodyPr>
+          <a:lstStyle>
+            <a:lvl1pPr algn="l" defTabSz="685800" rtl="0" eaLnBrk="1" latinLnBrk="0" hangingPunct="1">
+              <a:lnSpc>
+                <a:spcPct val="90000"/>
+              </a:lnSpc>
+              <a:spcBef>
+                <a:spcPct val="0"/>
+              </a:spcBef>
+              <a:buNone/>
+              <a:defRPr sz="3300" kern="1200">
+                <a:solidFill>
+                  <a:schemeClr val="tx1"/>
+                </a:solidFill>
+                <a:latin typeface="+mj-lt"/>
+                <a:ea typeface="+mj-ea"/>
+                <a:cs typeface="+mj-cs"/>
+              </a:defRPr>
+            </a:lvl1pPr>
+          </a:lstStyle>
+          <a:p>
+            <a:pPr fontAlgn="auto">
+              <a:spcAft>
+                <a:spcPts val="0"/>
+              </a:spcAft>
+            </a:pPr>
+            <a:r>
+              <a:rPr lang="en-US" dirty="0"/>
+              <a:t>I2C Slave - 15h</a:t>
+            </a:r>
+          </a:p>
+        </p:txBody>
+      </p:sp>
+    </p:spTree>
+    <p:extLst>
+      <p:ext uri="{BB962C8B-B14F-4D97-AF65-F5344CB8AC3E}">
+        <p14:creationId xmlns:p14="http://schemas.microsoft.com/office/powerpoint/2010/main" val="237926173"/>
+      </p:ext>
+    </p:extLst>
+  </p:cSld>
+  <p:clrMapOvr>
+    <a:masterClrMapping/>
+  </p:clrMapOvr>
+</p:sld>
+</file>
+
+<file path=ppt/slides/slide7.xml><?xml version="1.0" encoding="utf-8"?>
+<p:sld xmlns:a="http://schemas.openxmlformats.org/drawingml/2006/main" xmlns:r="http://schemas.openxmlformats.org/officeDocument/2006/relationships" xmlns:p="http://schemas.openxmlformats.org/presentationml/2006/main">
+  <p:cSld>
+    <p:spTree>
+      <p:nvGrpSpPr>
+        <p:cNvPr id="1" name=""/>
+        <p:cNvGrpSpPr/>
+        <p:nvPr/>
+      </p:nvGrpSpPr>
+      <p:grpSpPr>
+        <a:xfrm>
+          <a:off x="0" y="0"/>
+          <a:ext cx="0" cy="0"/>
+          <a:chOff x="0" y="0"/>
+          <a:chExt cx="0" cy="0"/>
+        </a:xfrm>
+      </p:grpSpPr>
+      <p:sp>
+        <p:nvSpPr>
+          <p:cNvPr id="2" name="Title 1">
+            <a:extLst>
+              <a:ext uri="{FF2B5EF4-FFF2-40B4-BE49-F238E27FC236}">
+                <a16:creationId xmlns:a16="http://schemas.microsoft.com/office/drawing/2014/main" id="{A38D5CBB-DE1C-47A1-A64B-11D31E5B8E5B}"/>
+              </a:ext>
+            </a:extLst>
+          </p:cNvPr>
+          <p:cNvSpPr>
+            <a:spLocks noGrp="1"/>
+          </p:cNvSpPr>
+          <p:nvPr>
+            <p:ph type="title"/>
+          </p:nvPr>
+        </p:nvSpPr>
+        <p:spPr/>
+        <p:txBody>
+          <a:bodyPr/>
+          <a:lstStyle/>
+          <a:p>
+            <a:r>
+              <a:rPr lang="en-US" dirty="0"/>
+              <a:t>References</a:t>
+            </a:r>
+          </a:p>
+        </p:txBody>
+      </p:sp>
+    </p:spTree>
+    <p:extLst>
+      <p:ext uri="{BB962C8B-B14F-4D97-AF65-F5344CB8AC3E}">
+        <p14:creationId xmlns:p14="http://schemas.microsoft.com/office/powerpoint/2010/main" val="3207602261"/>
+      </p:ext>
+    </p:extLst>
+  </p:cSld>
+  <p:clrMapOvr>
+    <a:masterClrMapping/>
+  </p:clrMapOvr>
+</p:sld>
+</file>
+
+<file path=ppt/slides/slide8.xml><?xml version="1.0" encoding="utf-8"?>
 <p:sld xmlns:a="http://schemas.openxmlformats.org/drawingml/2006/main" xmlns:r="http://schemas.openxmlformats.org/officeDocument/2006/relationships" xmlns:p="http://schemas.openxmlformats.org/presentationml/2006/main" show="0">
   <p:cSld>
     <p:spTree>
@@ -17801,685 +18592,6 @@
     <p:extLst>
       <p:ext uri="{BB962C8B-B14F-4D97-AF65-F5344CB8AC3E}">
         <p14:creationId xmlns:p14="http://schemas.microsoft.com/office/powerpoint/2010/main" val="2733106043"/>
-      </p:ext>
-    </p:extLst>
-  </p:cSld>
-  <p:clrMapOvr>
-    <a:masterClrMapping/>
-  </p:clrMapOvr>
-</p:sld>
-</file>
-
-<file path=ppt/slides/slide4.xml><?xml version="1.0" encoding="utf-8"?>
-<p:sld xmlns:a="http://schemas.openxmlformats.org/drawingml/2006/main" xmlns:r="http://schemas.openxmlformats.org/officeDocument/2006/relationships" xmlns:p="http://schemas.openxmlformats.org/presentationml/2006/main">
-  <p:cSld>
-    <p:spTree>
-      <p:nvGrpSpPr>
-        <p:cNvPr id="1" name=""/>
-        <p:cNvGrpSpPr/>
-        <p:nvPr/>
-      </p:nvGrpSpPr>
-      <p:grpSpPr>
-        <a:xfrm>
-          <a:off x="0" y="0"/>
-          <a:ext cx="0" cy="0"/>
-          <a:chOff x="0" y="0"/>
-          <a:chExt cx="0" cy="0"/>
-        </a:xfrm>
-      </p:grpSpPr>
-      <p:pic>
-        <p:nvPicPr>
-          <p:cNvPr id="3" name="Picture 2">
-            <a:extLst>
-              <a:ext uri="{FF2B5EF4-FFF2-40B4-BE49-F238E27FC236}">
-                <a16:creationId xmlns:a16="http://schemas.microsoft.com/office/drawing/2014/main" id="{460D997F-CF66-46D8-986C-B615DCEFFDF6}"/>
-              </a:ext>
-            </a:extLst>
-          </p:cNvPr>
-          <p:cNvPicPr>
-            <a:picLocks noChangeAspect="1"/>
-          </p:cNvPicPr>
-          <p:nvPr/>
-        </p:nvPicPr>
-        <p:blipFill>
-          <a:blip r:embed="rId2"/>
-          <a:stretch>
-            <a:fillRect/>
-          </a:stretch>
-        </p:blipFill>
-        <p:spPr>
-          <a:xfrm>
-            <a:off x="0" y="724234"/>
-            <a:ext cx="9144000" cy="2102713"/>
-          </a:xfrm>
-          <a:prstGeom prst="rect">
-            <a:avLst/>
-          </a:prstGeom>
-        </p:spPr>
-      </p:pic>
-      <p:cxnSp>
-        <p:nvCxnSpPr>
-          <p:cNvPr id="5" name="Straight Connector 4">
-            <a:extLst>
-              <a:ext uri="{FF2B5EF4-FFF2-40B4-BE49-F238E27FC236}">
-                <a16:creationId xmlns:a16="http://schemas.microsoft.com/office/drawing/2014/main" id="{10252BED-8989-485F-B2DD-E0A61CDDD8AE}"/>
-              </a:ext>
-            </a:extLst>
-          </p:cNvPr>
-          <p:cNvCxnSpPr/>
-          <p:nvPr/>
-        </p:nvCxnSpPr>
-        <p:spPr>
-          <a:xfrm>
-            <a:off x="2128345" y="1775590"/>
-            <a:ext cx="0" cy="1442545"/>
-          </a:xfrm>
-          <a:prstGeom prst="line">
-            <a:avLst/>
-          </a:prstGeom>
-          <a:ln w="12700">
-            <a:solidFill>
-              <a:srgbClr val="FF0000"/>
-            </a:solidFill>
-          </a:ln>
-        </p:spPr>
-        <p:style>
-          <a:lnRef idx="1">
-            <a:schemeClr val="accent1"/>
-          </a:lnRef>
-          <a:fillRef idx="0">
-            <a:schemeClr val="accent1"/>
-          </a:fillRef>
-          <a:effectRef idx="0">
-            <a:schemeClr val="accent1"/>
-          </a:effectRef>
-          <a:fontRef idx="minor">
-            <a:schemeClr val="tx1"/>
-          </a:fontRef>
-        </p:style>
-      </p:cxnSp>
-      <p:cxnSp>
-        <p:nvCxnSpPr>
-          <p:cNvPr id="6" name="Straight Connector 5">
-            <a:extLst>
-              <a:ext uri="{FF2B5EF4-FFF2-40B4-BE49-F238E27FC236}">
-                <a16:creationId xmlns:a16="http://schemas.microsoft.com/office/drawing/2014/main" id="{A196DB49-60D8-4D71-A86E-A027FE6FAB0B}"/>
-              </a:ext>
-            </a:extLst>
-          </p:cNvPr>
-          <p:cNvCxnSpPr/>
-          <p:nvPr/>
-        </p:nvCxnSpPr>
-        <p:spPr>
-          <a:xfrm>
-            <a:off x="2687145" y="1775590"/>
-            <a:ext cx="0" cy="1442545"/>
-          </a:xfrm>
-          <a:prstGeom prst="line">
-            <a:avLst/>
-          </a:prstGeom>
-          <a:ln w="12700">
-            <a:solidFill>
-              <a:srgbClr val="FF0000"/>
-            </a:solidFill>
-          </a:ln>
-        </p:spPr>
-        <p:style>
-          <a:lnRef idx="1">
-            <a:schemeClr val="accent1"/>
-          </a:lnRef>
-          <a:fillRef idx="0">
-            <a:schemeClr val="accent1"/>
-          </a:fillRef>
-          <a:effectRef idx="0">
-            <a:schemeClr val="accent1"/>
-          </a:effectRef>
-          <a:fontRef idx="minor">
-            <a:schemeClr val="tx1"/>
-          </a:fontRef>
-        </p:style>
-      </p:cxnSp>
-      <p:cxnSp>
-        <p:nvCxnSpPr>
-          <p:cNvPr id="7" name="Straight Connector 6">
-            <a:extLst>
-              <a:ext uri="{FF2B5EF4-FFF2-40B4-BE49-F238E27FC236}">
-                <a16:creationId xmlns:a16="http://schemas.microsoft.com/office/drawing/2014/main" id="{1363FF80-AC37-4BFE-822B-6D8B8E52A48B}"/>
-              </a:ext>
-            </a:extLst>
-          </p:cNvPr>
-          <p:cNvCxnSpPr/>
-          <p:nvPr/>
-        </p:nvCxnSpPr>
-        <p:spPr>
-          <a:xfrm>
-            <a:off x="3250178" y="1775589"/>
-            <a:ext cx="0" cy="1442545"/>
-          </a:xfrm>
-          <a:prstGeom prst="line">
-            <a:avLst/>
-          </a:prstGeom>
-          <a:ln w="12700">
-            <a:solidFill>
-              <a:srgbClr val="FF0000"/>
-            </a:solidFill>
-          </a:ln>
-        </p:spPr>
-        <p:style>
-          <a:lnRef idx="1">
-            <a:schemeClr val="accent1"/>
-          </a:lnRef>
-          <a:fillRef idx="0">
-            <a:schemeClr val="accent1"/>
-          </a:fillRef>
-          <a:effectRef idx="0">
-            <a:schemeClr val="accent1"/>
-          </a:effectRef>
-          <a:fontRef idx="minor">
-            <a:schemeClr val="tx1"/>
-          </a:fontRef>
-        </p:style>
-      </p:cxnSp>
-      <p:cxnSp>
-        <p:nvCxnSpPr>
-          <p:cNvPr id="8" name="Straight Connector 7">
-            <a:extLst>
-              <a:ext uri="{FF2B5EF4-FFF2-40B4-BE49-F238E27FC236}">
-                <a16:creationId xmlns:a16="http://schemas.microsoft.com/office/drawing/2014/main" id="{203FD3B3-FE90-4B84-B43E-EE53F1B6BCB6}"/>
-              </a:ext>
-            </a:extLst>
-          </p:cNvPr>
-          <p:cNvCxnSpPr/>
-          <p:nvPr/>
-        </p:nvCxnSpPr>
-        <p:spPr>
-          <a:xfrm>
-            <a:off x="3821679" y="1741722"/>
-            <a:ext cx="0" cy="1442545"/>
-          </a:xfrm>
-          <a:prstGeom prst="line">
-            <a:avLst/>
-          </a:prstGeom>
-          <a:ln w="12700">
-            <a:solidFill>
-              <a:srgbClr val="FF0000"/>
-            </a:solidFill>
-          </a:ln>
-        </p:spPr>
-        <p:style>
-          <a:lnRef idx="1">
-            <a:schemeClr val="accent1"/>
-          </a:lnRef>
-          <a:fillRef idx="0">
-            <a:schemeClr val="accent1"/>
-          </a:fillRef>
-          <a:effectRef idx="0">
-            <a:schemeClr val="accent1"/>
-          </a:effectRef>
-          <a:fontRef idx="minor">
-            <a:schemeClr val="tx1"/>
-          </a:fontRef>
-        </p:style>
-      </p:cxnSp>
-      <p:cxnSp>
-        <p:nvCxnSpPr>
-          <p:cNvPr id="9" name="Straight Connector 8">
-            <a:extLst>
-              <a:ext uri="{FF2B5EF4-FFF2-40B4-BE49-F238E27FC236}">
-                <a16:creationId xmlns:a16="http://schemas.microsoft.com/office/drawing/2014/main" id="{23C46B43-B893-45FD-8663-49B7232A37D6}"/>
-              </a:ext>
-            </a:extLst>
-          </p:cNvPr>
-          <p:cNvCxnSpPr/>
-          <p:nvPr/>
-        </p:nvCxnSpPr>
-        <p:spPr>
-          <a:xfrm>
-            <a:off x="4372012" y="1741722"/>
-            <a:ext cx="0" cy="1442545"/>
-          </a:xfrm>
-          <a:prstGeom prst="line">
-            <a:avLst/>
-          </a:prstGeom>
-          <a:ln w="12700">
-            <a:solidFill>
-              <a:srgbClr val="FF0000"/>
-            </a:solidFill>
-          </a:ln>
-        </p:spPr>
-        <p:style>
-          <a:lnRef idx="1">
-            <a:schemeClr val="accent1"/>
-          </a:lnRef>
-          <a:fillRef idx="0">
-            <a:schemeClr val="accent1"/>
-          </a:fillRef>
-          <a:effectRef idx="0">
-            <a:schemeClr val="accent1"/>
-          </a:effectRef>
-          <a:fontRef idx="minor">
-            <a:schemeClr val="tx1"/>
-          </a:fontRef>
-        </p:style>
-      </p:cxnSp>
-      <p:cxnSp>
-        <p:nvCxnSpPr>
-          <p:cNvPr id="10" name="Straight Connector 9">
-            <a:extLst>
-              <a:ext uri="{FF2B5EF4-FFF2-40B4-BE49-F238E27FC236}">
-                <a16:creationId xmlns:a16="http://schemas.microsoft.com/office/drawing/2014/main" id="{2B4FCEB1-5344-46CD-AF03-35432A66083B}"/>
-              </a:ext>
-            </a:extLst>
-          </p:cNvPr>
-          <p:cNvCxnSpPr/>
-          <p:nvPr/>
-        </p:nvCxnSpPr>
-        <p:spPr>
-          <a:xfrm>
-            <a:off x="4926578" y="1741721"/>
-            <a:ext cx="0" cy="1442545"/>
-          </a:xfrm>
-          <a:prstGeom prst="line">
-            <a:avLst/>
-          </a:prstGeom>
-          <a:ln w="12700">
-            <a:solidFill>
-              <a:srgbClr val="FF0000"/>
-            </a:solidFill>
-          </a:ln>
-        </p:spPr>
-        <p:style>
-          <a:lnRef idx="1">
-            <a:schemeClr val="accent1"/>
-          </a:lnRef>
-          <a:fillRef idx="0">
-            <a:schemeClr val="accent1"/>
-          </a:fillRef>
-          <a:effectRef idx="0">
-            <a:schemeClr val="accent1"/>
-          </a:effectRef>
-          <a:fontRef idx="minor">
-            <a:schemeClr val="tx1"/>
-          </a:fontRef>
-        </p:style>
-      </p:cxnSp>
-      <p:cxnSp>
-        <p:nvCxnSpPr>
-          <p:cNvPr id="11" name="Straight Connector 10">
-            <a:extLst>
-              <a:ext uri="{FF2B5EF4-FFF2-40B4-BE49-F238E27FC236}">
-                <a16:creationId xmlns:a16="http://schemas.microsoft.com/office/drawing/2014/main" id="{16808760-DAC0-430F-B774-AF8C1C37A23C}"/>
-              </a:ext>
-            </a:extLst>
-          </p:cNvPr>
-          <p:cNvCxnSpPr/>
-          <p:nvPr/>
-        </p:nvCxnSpPr>
-        <p:spPr>
-          <a:xfrm>
-            <a:off x="5489611" y="1741720"/>
-            <a:ext cx="0" cy="1442545"/>
-          </a:xfrm>
-          <a:prstGeom prst="line">
-            <a:avLst/>
-          </a:prstGeom>
-          <a:ln w="12700">
-            <a:solidFill>
-              <a:srgbClr val="FF0000"/>
-            </a:solidFill>
-          </a:ln>
-        </p:spPr>
-        <p:style>
-          <a:lnRef idx="1">
-            <a:schemeClr val="accent1"/>
-          </a:lnRef>
-          <a:fillRef idx="0">
-            <a:schemeClr val="accent1"/>
-          </a:fillRef>
-          <a:effectRef idx="0">
-            <a:schemeClr val="accent1"/>
-          </a:effectRef>
-          <a:fontRef idx="minor">
-            <a:schemeClr val="tx1"/>
-          </a:fontRef>
-        </p:style>
-      </p:cxnSp>
-      <p:cxnSp>
-        <p:nvCxnSpPr>
-          <p:cNvPr id="12" name="Straight Connector 11">
-            <a:extLst>
-              <a:ext uri="{FF2B5EF4-FFF2-40B4-BE49-F238E27FC236}">
-                <a16:creationId xmlns:a16="http://schemas.microsoft.com/office/drawing/2014/main" id="{2F5A12B0-1E62-4FC2-ADF2-357C285F135F}"/>
-              </a:ext>
-            </a:extLst>
-          </p:cNvPr>
-          <p:cNvCxnSpPr/>
-          <p:nvPr/>
-        </p:nvCxnSpPr>
-        <p:spPr>
-          <a:xfrm>
-            <a:off x="6048411" y="1741719"/>
-            <a:ext cx="0" cy="1442545"/>
-          </a:xfrm>
-          <a:prstGeom prst="line">
-            <a:avLst/>
-          </a:prstGeom>
-          <a:ln w="12700">
-            <a:solidFill>
-              <a:srgbClr val="FF0000"/>
-            </a:solidFill>
-          </a:ln>
-        </p:spPr>
-        <p:style>
-          <a:lnRef idx="1">
-            <a:schemeClr val="accent1"/>
-          </a:lnRef>
-          <a:fillRef idx="0">
-            <a:schemeClr val="accent1"/>
-          </a:fillRef>
-          <a:effectRef idx="0">
-            <a:schemeClr val="accent1"/>
-          </a:effectRef>
-          <a:fontRef idx="minor">
-            <a:schemeClr val="tx1"/>
-          </a:fontRef>
-        </p:style>
-      </p:cxnSp>
-      <p:cxnSp>
-        <p:nvCxnSpPr>
-          <p:cNvPr id="13" name="Straight Connector 12">
-            <a:extLst>
-              <a:ext uri="{FF2B5EF4-FFF2-40B4-BE49-F238E27FC236}">
-                <a16:creationId xmlns:a16="http://schemas.microsoft.com/office/drawing/2014/main" id="{F0774017-276E-4307-85FF-8CDDE3F8E12F}"/>
-              </a:ext>
-            </a:extLst>
-          </p:cNvPr>
-          <p:cNvCxnSpPr/>
-          <p:nvPr/>
-        </p:nvCxnSpPr>
-        <p:spPr>
-          <a:xfrm>
-            <a:off x="6607211" y="1741719"/>
-            <a:ext cx="0" cy="1442545"/>
-          </a:xfrm>
-          <a:prstGeom prst="line">
-            <a:avLst/>
-          </a:prstGeom>
-          <a:ln w="12700">
-            <a:solidFill>
-              <a:srgbClr val="FF0000"/>
-            </a:solidFill>
-          </a:ln>
-        </p:spPr>
-        <p:style>
-          <a:lnRef idx="1">
-            <a:schemeClr val="accent1"/>
-          </a:lnRef>
-          <a:fillRef idx="0">
-            <a:schemeClr val="accent1"/>
-          </a:fillRef>
-          <a:effectRef idx="0">
-            <a:schemeClr val="accent1"/>
-          </a:effectRef>
-          <a:fontRef idx="minor">
-            <a:schemeClr val="tx1"/>
-          </a:fontRef>
-        </p:style>
-      </p:cxnSp>
-      <p:cxnSp>
-        <p:nvCxnSpPr>
-          <p:cNvPr id="14" name="Straight Connector 13">
-            <a:extLst>
-              <a:ext uri="{FF2B5EF4-FFF2-40B4-BE49-F238E27FC236}">
-                <a16:creationId xmlns:a16="http://schemas.microsoft.com/office/drawing/2014/main" id="{1B4BDD60-9908-4CC8-8272-D13ECDC31CFA}"/>
-              </a:ext>
-            </a:extLst>
-          </p:cNvPr>
-          <p:cNvCxnSpPr/>
-          <p:nvPr/>
-        </p:nvCxnSpPr>
-        <p:spPr>
-          <a:xfrm>
-            <a:off x="7170244" y="1741719"/>
-            <a:ext cx="0" cy="1442545"/>
-          </a:xfrm>
-          <a:prstGeom prst="line">
-            <a:avLst/>
-          </a:prstGeom>
-          <a:ln w="12700">
-            <a:solidFill>
-              <a:srgbClr val="FF0000"/>
-            </a:solidFill>
-          </a:ln>
-        </p:spPr>
-        <p:style>
-          <a:lnRef idx="1">
-            <a:schemeClr val="accent1"/>
-          </a:lnRef>
-          <a:fillRef idx="0">
-            <a:schemeClr val="accent1"/>
-          </a:fillRef>
-          <a:effectRef idx="0">
-            <a:schemeClr val="accent1"/>
-          </a:effectRef>
-          <a:fontRef idx="minor">
-            <a:schemeClr val="tx1"/>
-          </a:fontRef>
-        </p:style>
-      </p:cxnSp>
-      <p:cxnSp>
-        <p:nvCxnSpPr>
-          <p:cNvPr id="15" name="Straight Connector 14">
-            <a:extLst>
-              <a:ext uri="{FF2B5EF4-FFF2-40B4-BE49-F238E27FC236}">
-                <a16:creationId xmlns:a16="http://schemas.microsoft.com/office/drawing/2014/main" id="{CA90D8AB-5F67-43B6-BB51-D9118E4C0E57}"/>
-              </a:ext>
-            </a:extLst>
-          </p:cNvPr>
-          <p:cNvCxnSpPr/>
-          <p:nvPr/>
-        </p:nvCxnSpPr>
-        <p:spPr>
-          <a:xfrm>
-            <a:off x="7733277" y="1741719"/>
-            <a:ext cx="0" cy="1442545"/>
-          </a:xfrm>
-          <a:prstGeom prst="line">
-            <a:avLst/>
-          </a:prstGeom>
-          <a:ln w="12700">
-            <a:solidFill>
-              <a:srgbClr val="FF0000"/>
-            </a:solidFill>
-          </a:ln>
-        </p:spPr>
-        <p:style>
-          <a:lnRef idx="1">
-            <a:schemeClr val="accent1"/>
-          </a:lnRef>
-          <a:fillRef idx="0">
-            <a:schemeClr val="accent1"/>
-          </a:fillRef>
-          <a:effectRef idx="0">
-            <a:schemeClr val="accent1"/>
-          </a:effectRef>
-          <a:fontRef idx="minor">
-            <a:schemeClr val="tx1"/>
-          </a:fontRef>
-        </p:style>
-      </p:cxnSp>
-      <p:cxnSp>
-        <p:nvCxnSpPr>
-          <p:cNvPr id="16" name="Straight Connector 15">
-            <a:extLst>
-              <a:ext uri="{FF2B5EF4-FFF2-40B4-BE49-F238E27FC236}">
-                <a16:creationId xmlns:a16="http://schemas.microsoft.com/office/drawing/2014/main" id="{B369316A-EBA4-438C-976E-9C4C32F26A33}"/>
-              </a:ext>
-            </a:extLst>
-          </p:cNvPr>
-          <p:cNvCxnSpPr/>
-          <p:nvPr/>
-        </p:nvCxnSpPr>
-        <p:spPr>
-          <a:xfrm>
-            <a:off x="8296310" y="1741718"/>
-            <a:ext cx="0" cy="1442545"/>
-          </a:xfrm>
-          <a:prstGeom prst="line">
-            <a:avLst/>
-          </a:prstGeom>
-          <a:ln w="12700">
-            <a:solidFill>
-              <a:srgbClr val="FF0000"/>
-            </a:solidFill>
-          </a:ln>
-        </p:spPr>
-        <p:style>
-          <a:lnRef idx="1">
-            <a:schemeClr val="accent1"/>
-          </a:lnRef>
-          <a:fillRef idx="0">
-            <a:schemeClr val="accent1"/>
-          </a:fillRef>
-          <a:effectRef idx="0">
-            <a:schemeClr val="accent1"/>
-          </a:effectRef>
-          <a:fontRef idx="minor">
-            <a:schemeClr val="tx1"/>
-          </a:fontRef>
-        </p:style>
-      </p:cxnSp>
-      <p:cxnSp>
-        <p:nvCxnSpPr>
-          <p:cNvPr id="17" name="Straight Connector 16">
-            <a:extLst>
-              <a:ext uri="{FF2B5EF4-FFF2-40B4-BE49-F238E27FC236}">
-                <a16:creationId xmlns:a16="http://schemas.microsoft.com/office/drawing/2014/main" id="{2BB0BA8F-0E4A-45C0-B0BF-87BF37315A39}"/>
-              </a:ext>
-            </a:extLst>
-          </p:cNvPr>
-          <p:cNvCxnSpPr/>
-          <p:nvPr/>
-        </p:nvCxnSpPr>
-        <p:spPr>
-          <a:xfrm>
-            <a:off x="8723877" y="1775589"/>
-            <a:ext cx="0" cy="1442545"/>
-          </a:xfrm>
-          <a:prstGeom prst="line">
-            <a:avLst/>
-          </a:prstGeom>
-          <a:ln w="12700">
-            <a:solidFill>
-              <a:srgbClr val="FF0000"/>
-            </a:solidFill>
-          </a:ln>
-        </p:spPr>
-        <p:style>
-          <a:lnRef idx="1">
-            <a:schemeClr val="accent1"/>
-          </a:lnRef>
-          <a:fillRef idx="0">
-            <a:schemeClr val="accent1"/>
-          </a:fillRef>
-          <a:effectRef idx="0">
-            <a:schemeClr val="accent1"/>
-          </a:effectRef>
-          <a:fontRef idx="minor">
-            <a:schemeClr val="tx1"/>
-          </a:fontRef>
-        </p:style>
-      </p:cxnSp>
-      <mc:AlternateContent xmlns:mc="http://schemas.openxmlformats.org/markup-compatibility/2006">
-        <mc:Choice xmlns:p14="http://schemas.microsoft.com/office/powerpoint/2010/main" Requires="p14">
-          <p:contentPart p14:bwMode="auto" r:id="rId3">
-            <p14:nvContentPartPr>
-              <p14:cNvPr id="18" name="Ink 17">
-                <a:extLst>
-                  <a:ext uri="{FF2B5EF4-FFF2-40B4-BE49-F238E27FC236}">
-                    <a16:creationId xmlns:a16="http://schemas.microsoft.com/office/drawing/2014/main" id="{25C59AF8-1DE6-40E7-AFA6-4A16C8A52C7D}"/>
-                  </a:ext>
-                </a:extLst>
-              </p14:cNvPr>
-              <p14:cNvContentPartPr/>
-              <p14:nvPr/>
-            </p14:nvContentPartPr>
-            <p14:xfrm>
-              <a:off x="2347920" y="1542960"/>
-              <a:ext cx="5762880" cy="1081440"/>
-            </p14:xfrm>
-          </p:contentPart>
-        </mc:Choice>
-        <mc:Fallback>
-          <p:pic>
-            <p:nvPicPr>
-              <p:cNvPr id="18" name="Ink 17">
-                <a:extLst>
-                  <a:ext uri="{FF2B5EF4-FFF2-40B4-BE49-F238E27FC236}">
-                    <a16:creationId xmlns:a16="http://schemas.microsoft.com/office/drawing/2014/main" id="{25C59AF8-1DE6-40E7-AFA6-4A16C8A52C7D}"/>
-                  </a:ext>
-                </a:extLst>
-              </p:cNvPr>
-              <p:cNvPicPr/>
-              <p:nvPr/>
-            </p:nvPicPr>
-            <p:blipFill>
-              <a:blip r:embed="rId4"/>
-              <a:stretch>
-                <a:fillRect/>
-              </a:stretch>
-            </p:blipFill>
-            <p:spPr>
-              <a:xfrm>
-                <a:off x="2338560" y="1533600"/>
-                <a:ext cx="5781600" cy="1100160"/>
-              </a:xfrm>
-              <a:prstGeom prst="rect">
-                <a:avLst/>
-              </a:prstGeom>
-            </p:spPr>
-          </p:pic>
-        </mc:Fallback>
-      </mc:AlternateContent>
-      <p:sp>
-        <p:nvSpPr>
-          <p:cNvPr id="19" name="TextBox 18">
-            <a:extLst>
-              <a:ext uri="{FF2B5EF4-FFF2-40B4-BE49-F238E27FC236}">
-                <a16:creationId xmlns:a16="http://schemas.microsoft.com/office/drawing/2014/main" id="{CC64F8BD-698C-40BD-9933-388124E8CAF8}"/>
-              </a:ext>
-            </a:extLst>
-          </p:cNvPr>
-          <p:cNvSpPr txBox="1"/>
-          <p:nvPr/>
-        </p:nvSpPr>
-        <p:spPr>
-          <a:xfrm>
-            <a:off x="118836" y="13890"/>
-            <a:ext cx="2362199" cy="369332"/>
-          </a:xfrm>
-          <a:prstGeom prst="rect">
-            <a:avLst/>
-          </a:prstGeom>
-          <a:noFill/>
-        </p:spPr>
-        <p:txBody>
-          <a:bodyPr wrap="square" rtlCol="0">
-            <a:spAutoFit/>
-          </a:bodyPr>
-          <a:lstStyle/>
-          <a:p>
-            <a:r>
-              <a:rPr lang="en-US" dirty="0"/>
-              <a:t>I2C Master</a:t>
-            </a:r>
-          </a:p>
-        </p:txBody>
-      </p:sp>
-    </p:spTree>
-    <p:extLst>
-      <p:ext uri="{BB962C8B-B14F-4D97-AF65-F5344CB8AC3E}">
-        <p14:creationId xmlns:p14="http://schemas.microsoft.com/office/powerpoint/2010/main" val="3449446057"/>
       </p:ext>
     </p:extLst>
   </p:cSld>

</xml_diff>